<commit_message>
Atualizacao PPT Modulo 1
</commit_message>
<xml_diff>
--- a/ppt/Fundamentos em Arquitetura de Software com C# - Modulo 2.pptx
+++ b/ppt/Fundamentos em Arquitetura de Software com C# - Modulo 2.pptx
@@ -3434,7 +3434,7 @@
           <a:p>
             <a:fld id="{ED95D740-6A7E-4AE4-809A-1783B6BB9E99}" type="datetimeFigureOut">
               <a:rPr lang="pt-BR" smtClean="0"/>
-              <a:t>12/05/2014</a:t>
+              <a:t>05/07/2014</a:t>
             </a:fld>
             <a:endParaRPr lang="pt-BR" dirty="0"/>
           </a:p>
@@ -3626,7 +3626,7 @@
               <a:pPr>
                 <a:defRPr/>
               </a:pPr>
-              <a:t>12/05/2014</a:t>
+              <a:t>05/07/2014</a:t>
             </a:fld>
             <a:endParaRPr lang="pt-BR" dirty="0"/>
           </a:p>
@@ -11060,7 +11060,7 @@
               <a:pPr>
                 <a:defRPr/>
               </a:pPr>
-              <a:t>12/05/2014</a:t>
+              <a:t>05/07/2014</a:t>
             </a:fld>
             <a:endParaRPr lang="pt-BR" dirty="0"/>
           </a:p>
@@ -11415,7 +11415,7 @@
               <a:pPr>
                 <a:defRPr/>
               </a:pPr>
-              <a:t>12/05/2014</a:t>
+              <a:t>05/07/2014</a:t>
             </a:fld>
             <a:endParaRPr lang="pt-BR" dirty="0"/>
           </a:p>
@@ -11740,7 +11740,7 @@
               <a:pPr>
                 <a:defRPr/>
               </a:pPr>
-              <a:t>12/05/2014</a:t>
+              <a:t>05/07/2014</a:t>
             </a:fld>
             <a:endParaRPr lang="pt-BR" dirty="0"/>
           </a:p>
@@ -12144,7 +12144,7 @@
               <a:pPr>
                 <a:defRPr/>
               </a:pPr>
-              <a:t>12/05/2014</a:t>
+              <a:t>05/07/2014</a:t>
             </a:fld>
             <a:endParaRPr lang="pt-BR" dirty="0"/>
           </a:p>
@@ -12487,7 +12487,7 @@
               <a:pPr>
                 <a:defRPr/>
               </a:pPr>
-              <a:t>12/05/2014</a:t>
+              <a:t>05/07/2014</a:t>
             </a:fld>
             <a:endParaRPr lang="pt-BR" dirty="0"/>
           </a:p>
@@ -13019,7 +13019,7 @@
               <a:pPr>
                 <a:defRPr/>
               </a:pPr>
-              <a:t>12/05/2014</a:t>
+              <a:t>05/07/2014</a:t>
             </a:fld>
             <a:endParaRPr lang="pt-BR" dirty="0"/>
           </a:p>
@@ -13627,7 +13627,7 @@
               <a:pPr>
                 <a:defRPr/>
               </a:pPr>
-              <a:t>12/05/2014</a:t>
+              <a:t>05/07/2014</a:t>
             </a:fld>
             <a:endParaRPr lang="pt-BR" dirty="0"/>
           </a:p>
@@ -13895,7 +13895,7 @@
               <a:pPr>
                 <a:defRPr/>
               </a:pPr>
-              <a:t>12/05/2014</a:t>
+              <a:t>05/07/2014</a:t>
             </a:fld>
             <a:endParaRPr lang="pt-BR" dirty="0"/>
           </a:p>
@@ -14017,7 +14017,7 @@
               <a:pPr>
                 <a:defRPr/>
               </a:pPr>
-              <a:t>12/05/2014</a:t>
+              <a:t>05/07/2014</a:t>
             </a:fld>
             <a:endParaRPr lang="pt-BR" dirty="0"/>
           </a:p>
@@ -14341,7 +14341,7 @@
               <a:pPr>
                 <a:defRPr/>
               </a:pPr>
-              <a:t>12/05/2014</a:t>
+              <a:t>05/07/2014</a:t>
             </a:fld>
             <a:endParaRPr lang="pt-BR" dirty="0"/>
           </a:p>
@@ -14628,7 +14628,7 @@
               <a:pPr>
                 <a:defRPr/>
               </a:pPr>
-              <a:t>12/05/2014</a:t>
+              <a:t>05/07/2014</a:t>
             </a:fld>
             <a:endParaRPr lang="pt-BR" dirty="0"/>
           </a:p>
@@ -14921,7 +14921,7 @@
               <a:pPr>
                 <a:defRPr/>
               </a:pPr>
-              <a:t>12/05/2014</a:t>
+              <a:t>05/07/2014</a:t>
             </a:fld>
             <a:endParaRPr lang="pt-BR" dirty="0"/>
           </a:p>
@@ -22614,7 +22614,7 @@
         <p:spPr>
           <a:xfrm>
             <a:off x="838201" y="1825625"/>
-            <a:ext cx="10325099" cy="4351338"/>
+            <a:ext cx="11228881" cy="4351338"/>
           </a:xfrm>
         </p:spPr>
         <p:txBody>
@@ -22661,8 +22661,85 @@
               <a:rPr lang="pt-BR" sz="2800" dirty="0" smtClean="0">
                 <a:sym typeface="Arial" panose="020B0604020202020204" pitchFamily="34" charset="0"/>
               </a:rPr>
-              <a:t>Adiciona novas responsabilidades a um objeto dinamicamente. Provê uma alternativa flexível de extensão de funcionalidades.</a:t>
-            </a:r>
+              <a:t>Adiciona novas responsabilidades a um objeto dinamicamente. Provê uma alternativa flexível de extensão de funcionalidades</a:t>
+            </a:r>
+            <a:r>
+              <a:rPr lang="pt-BR" sz="2800" dirty="0" smtClean="0">
+                <a:sym typeface="Arial" panose="020B0604020202020204" pitchFamily="34" charset="0"/>
+              </a:rPr>
+              <a:t>.</a:t>
+            </a:r>
+          </a:p>
+          <a:p>
+            <a:pPr algn="just" defTabSz="912813">
+              <a:spcBef>
+                <a:spcPts val="488"/>
+              </a:spcBef>
+            </a:pPr>
+            <a:r>
+              <a:rPr lang="pt-BR" sz="2800" dirty="0" smtClean="0">
+                <a:sym typeface="Arial" panose="020B0604020202020204" pitchFamily="34" charset="0"/>
+              </a:rPr>
+              <a:t>        &lt;</a:t>
+            </a:r>
+            <a:r>
+              <a:rPr lang="pt-BR" sz="2800" dirty="0" err="1" smtClean="0">
+                <a:sym typeface="Arial" panose="020B0604020202020204" pitchFamily="34" charset="0"/>
+              </a:rPr>
+              <a:t>italic</a:t>
+            </a:r>
+            <a:r>
+              <a:rPr lang="pt-BR" sz="2800" dirty="0" smtClean="0">
+                <a:sym typeface="Arial" panose="020B0604020202020204" pitchFamily="34" charset="0"/>
+              </a:rPr>
+              <a:t>&gt;&lt;center&gt;&lt;</a:t>
+            </a:r>
+            <a:r>
+              <a:rPr lang="pt-BR" sz="2800" dirty="0" err="1" smtClean="0">
+                <a:sym typeface="Arial" panose="020B0604020202020204" pitchFamily="34" charset="0"/>
+              </a:rPr>
+              <a:t>bold</a:t>
+            </a:r>
+            <a:r>
+              <a:rPr lang="pt-BR" sz="2800" dirty="0" smtClean="0">
+                <a:sym typeface="Arial" panose="020B0604020202020204" pitchFamily="34" charset="0"/>
+              </a:rPr>
+              <a:t>&gt;Meu Texto&lt;/</a:t>
+            </a:r>
+            <a:r>
+              <a:rPr lang="pt-BR" sz="2800" dirty="0" err="1" smtClean="0">
+                <a:sym typeface="Arial" panose="020B0604020202020204" pitchFamily="34" charset="0"/>
+              </a:rPr>
+              <a:t>bold</a:t>
+            </a:r>
+            <a:r>
+              <a:rPr lang="pt-BR" sz="2800" dirty="0" smtClean="0">
+                <a:sym typeface="Arial" panose="020B0604020202020204" pitchFamily="34" charset="0"/>
+              </a:rPr>
+              <a:t>&gt;&lt;/center&gt;&lt;/</a:t>
+            </a:r>
+            <a:r>
+              <a:rPr lang="pt-BR" sz="2800" dirty="0" err="1" smtClean="0">
+                <a:sym typeface="Arial" panose="020B0604020202020204" pitchFamily="34" charset="0"/>
+              </a:rPr>
+              <a:t>italic</a:t>
+            </a:r>
+            <a:r>
+              <a:rPr lang="pt-BR" sz="2800" dirty="0">
+                <a:sym typeface="Arial" panose="020B0604020202020204" pitchFamily="34" charset="0"/>
+              </a:rPr>
+              <a:t>&gt;</a:t>
+            </a:r>
+          </a:p>
+          <a:p>
+            <a:pPr algn="just" defTabSz="912813">
+              <a:spcBef>
+                <a:spcPts val="488"/>
+              </a:spcBef>
+            </a:pPr>
+            <a:endParaRPr lang="pt-BR" sz="2800" dirty="0" smtClean="0">
+              <a:sym typeface="Arial" panose="020B0604020202020204" pitchFamily="34" charset="0"/>
+            </a:endParaRPr>
           </a:p>
         </p:txBody>
       </p:sp>
@@ -32303,7 +32380,19 @@
               <a:rPr lang="pt-BR" sz="3000" b="1" dirty="0">
                 <a:sym typeface="Arial" panose="020B0604020202020204" pitchFamily="34" charset="0"/>
               </a:rPr>
-              <a:t>Seria ideal que não passassem de 20 linhas</a:t>
+              <a:t>Seria ideal que não </a:t>
+            </a:r>
+            <a:r>
+              <a:rPr lang="pt-BR" sz="3000" b="1" dirty="0" smtClean="0">
+                <a:sym typeface="Arial" panose="020B0604020202020204" pitchFamily="34" charset="0"/>
+              </a:rPr>
+              <a:t>passe </a:t>
+            </a:r>
+            <a:r>
+              <a:rPr lang="pt-BR" sz="3000" b="1" dirty="0">
+                <a:sym typeface="Arial" panose="020B0604020202020204" pitchFamily="34" charset="0"/>
+              </a:rPr>
+              <a:t>de 20 linhas</a:t>
             </a:r>
           </a:p>
           <a:p>
@@ -37446,10 +37535,10 @@
               <a:t>(</a:t>
             </a:r>
             <a:r>
-              <a:rPr lang="pt-BR" sz="2800" b="1" dirty="0" err="1">
-                <a:sym typeface="Arial" panose="020B0604020202020204" pitchFamily="34" charset="0"/>
-              </a:rPr>
-              <a:t>funcionario.eHElegivelParaBenefício</a:t>
+              <a:rPr lang="pt-BR" sz="2800" b="1" dirty="0" err="1" smtClean="0">
+                <a:sym typeface="Arial" panose="020B0604020202020204" pitchFamily="34" charset="0"/>
+              </a:rPr>
+              <a:t>funcionario.eHElegivelParaBeneficio</a:t>
             </a:r>
             <a:r>
               <a:rPr lang="pt-BR" sz="2800" b="1" dirty="0">

</xml_diff>

<commit_message>
Adicao da aplicacao de Refactoring
</commit_message>
<xml_diff>
--- a/ppt/Fundamentos em Arquitetura de Software com C# - Modulo 2.pptx
+++ b/ppt/Fundamentos em Arquitetura de Software com C# - Modulo 2.pptx
@@ -5,10 +5,10 @@
     <p:sldMasterId id="2147483660" r:id="rId2"/>
   </p:sldMasterIdLst>
   <p:notesMasterIdLst>
-    <p:notesMasterId r:id="rId95"/>
+    <p:notesMasterId r:id="rId96"/>
   </p:notesMasterIdLst>
   <p:handoutMasterIdLst>
-    <p:handoutMasterId r:id="rId96"/>
+    <p:handoutMasterId r:id="rId97"/>
   </p:handoutMasterIdLst>
   <p:sldIdLst>
     <p:sldId id="280" r:id="rId3"/>
@@ -101,8 +101,9 @@
     <p:sldId id="414" r:id="rId90"/>
     <p:sldId id="415" r:id="rId91"/>
     <p:sldId id="407" r:id="rId92"/>
-    <p:sldId id="408" r:id="rId93"/>
-    <p:sldId id="334" r:id="rId94"/>
+    <p:sldId id="429" r:id="rId93"/>
+    <p:sldId id="408" r:id="rId94"/>
+    <p:sldId id="334" r:id="rId95"/>
   </p:sldIdLst>
   <p:sldSz cx="12192000" cy="6858000"/>
   <p:notesSz cx="6877050" cy="10001250"/>
@@ -326,6 +327,7 @@
             <p14:sldId id="414"/>
             <p14:sldId id="415"/>
             <p14:sldId id="407"/>
+            <p14:sldId id="429"/>
             <p14:sldId id="408"/>
             <p14:sldId id="334"/>
           </p14:sldIdLst>
@@ -3434,7 +3436,7 @@
           <a:p>
             <a:fld id="{ED95D740-6A7E-4AE4-809A-1783B6BB9E99}" type="datetimeFigureOut">
               <a:rPr lang="pt-BR" smtClean="0"/>
-              <a:t>05/07/2014</a:t>
+              <a:t>20/08/2014</a:t>
             </a:fld>
             <a:endParaRPr lang="pt-BR" dirty="0"/>
           </a:p>
@@ -3626,7 +3628,7 @@
               <a:pPr>
                 <a:defRPr/>
               </a:pPr>
-              <a:t>05/07/2014</a:t>
+              <a:t>20/08/2014</a:t>
             </a:fld>
             <a:endParaRPr lang="pt-BR" dirty="0"/>
           </a:p>
@@ -10419,7 +10421,7 @@
                 </a:spcAft>
                 <a:buSzPct val="100000"/>
               </a:pPr>
-              <a:t>92</a:t>
+              <a:t>93</a:t>
             </a:fld>
             <a:endParaRPr lang="en-US">
               <a:solidFill>
@@ -11060,7 +11062,7 @@
               <a:pPr>
                 <a:defRPr/>
               </a:pPr>
-              <a:t>05/07/2014</a:t>
+              <a:t>20/08/2014</a:t>
             </a:fld>
             <a:endParaRPr lang="pt-BR" dirty="0"/>
           </a:p>
@@ -11415,7 +11417,7 @@
               <a:pPr>
                 <a:defRPr/>
               </a:pPr>
-              <a:t>05/07/2014</a:t>
+              <a:t>20/08/2014</a:t>
             </a:fld>
             <a:endParaRPr lang="pt-BR" dirty="0"/>
           </a:p>
@@ -11740,7 +11742,7 @@
               <a:pPr>
                 <a:defRPr/>
               </a:pPr>
-              <a:t>05/07/2014</a:t>
+              <a:t>20/08/2014</a:t>
             </a:fld>
             <a:endParaRPr lang="pt-BR" dirty="0"/>
           </a:p>
@@ -12144,7 +12146,7 @@
               <a:pPr>
                 <a:defRPr/>
               </a:pPr>
-              <a:t>05/07/2014</a:t>
+              <a:t>20/08/2014</a:t>
             </a:fld>
             <a:endParaRPr lang="pt-BR" dirty="0"/>
           </a:p>
@@ -12487,7 +12489,7 @@
               <a:pPr>
                 <a:defRPr/>
               </a:pPr>
-              <a:t>05/07/2014</a:t>
+              <a:t>20/08/2014</a:t>
             </a:fld>
             <a:endParaRPr lang="pt-BR" dirty="0"/>
           </a:p>
@@ -13019,7 +13021,7 @@
               <a:pPr>
                 <a:defRPr/>
               </a:pPr>
-              <a:t>05/07/2014</a:t>
+              <a:t>20/08/2014</a:t>
             </a:fld>
             <a:endParaRPr lang="pt-BR" dirty="0"/>
           </a:p>
@@ -13627,7 +13629,7 @@
               <a:pPr>
                 <a:defRPr/>
               </a:pPr>
-              <a:t>05/07/2014</a:t>
+              <a:t>20/08/2014</a:t>
             </a:fld>
             <a:endParaRPr lang="pt-BR" dirty="0"/>
           </a:p>
@@ -13895,7 +13897,7 @@
               <a:pPr>
                 <a:defRPr/>
               </a:pPr>
-              <a:t>05/07/2014</a:t>
+              <a:t>20/08/2014</a:t>
             </a:fld>
             <a:endParaRPr lang="pt-BR" dirty="0"/>
           </a:p>
@@ -14017,7 +14019,7 @@
               <a:pPr>
                 <a:defRPr/>
               </a:pPr>
-              <a:t>05/07/2014</a:t>
+              <a:t>20/08/2014</a:t>
             </a:fld>
             <a:endParaRPr lang="pt-BR" dirty="0"/>
           </a:p>
@@ -14341,7 +14343,7 @@
               <a:pPr>
                 <a:defRPr/>
               </a:pPr>
-              <a:t>05/07/2014</a:t>
+              <a:t>20/08/2014</a:t>
             </a:fld>
             <a:endParaRPr lang="pt-BR" dirty="0"/>
           </a:p>
@@ -14628,7 +14630,7 @@
               <a:pPr>
                 <a:defRPr/>
               </a:pPr>
-              <a:t>05/07/2014</a:t>
+              <a:t>20/08/2014</a:t>
             </a:fld>
             <a:endParaRPr lang="pt-BR" dirty="0"/>
           </a:p>
@@ -14921,7 +14923,7 @@
               <a:pPr>
                 <a:defRPr/>
               </a:pPr>
-              <a:t>05/07/2014</a:t>
+              <a:t>20/08/2014</a:t>
             </a:fld>
             <a:endParaRPr lang="pt-BR" dirty="0"/>
           </a:p>
@@ -22661,13 +22663,7 @@
               <a:rPr lang="pt-BR" sz="2800" dirty="0" smtClean="0">
                 <a:sym typeface="Arial" panose="020B0604020202020204" pitchFamily="34" charset="0"/>
               </a:rPr>
-              <a:t>Adiciona novas responsabilidades a um objeto dinamicamente. Provê uma alternativa flexível de extensão de funcionalidades</a:t>
-            </a:r>
-            <a:r>
-              <a:rPr lang="pt-BR" sz="2800" dirty="0" smtClean="0">
-                <a:sym typeface="Arial" panose="020B0604020202020204" pitchFamily="34" charset="0"/>
-              </a:rPr>
-              <a:t>.</a:t>
+              <a:t>Adiciona novas responsabilidades a um objeto dinamicamente. Provê uma alternativa flexível de extensão de funcionalidades.</a:t>
             </a:r>
           </a:p>
           <a:p>
@@ -22884,7 +22880,7 @@
         </p:blipFill>
         <p:spPr bwMode="auto">
           <a:xfrm>
-            <a:off x="4414838" y="2792414"/>
+            <a:off x="3816942" y="1979614"/>
             <a:ext cx="4324350" cy="3571875"/>
           </a:xfrm>
           <a:prstGeom prst="rect">
@@ -41789,6 +41785,12 @@
               </a:rPr>
               <a:t>Class</a:t>
             </a:r>
+            <a:r>
+              <a:rPr lang="pt-BR" sz="2800" dirty="0" smtClean="0">
+                <a:sym typeface="Arial" panose="020B0604020202020204" pitchFamily="34" charset="0"/>
+              </a:rPr>
+              <a:t>*</a:t>
+            </a:r>
             <a:endParaRPr lang="pt-BR" sz="2800" dirty="0" smtClean="0">
               <a:sym typeface="Arial" panose="020B0604020202020204" pitchFamily="34" charset="0"/>
             </a:endParaRPr>
@@ -41804,27 +41806,19 @@
               <a:rPr lang="pt-BR" sz="2800" dirty="0" smtClean="0">
                 <a:sym typeface="Arial" panose="020B0604020202020204" pitchFamily="34" charset="0"/>
               </a:rPr>
-              <a:t> Interface</a:t>
-            </a:r>
-          </a:p>
-          <a:p>
+              <a:t> </a:t>
+            </a:r>
             <a:r>
               <a:rPr lang="pt-BR" sz="2800" dirty="0" err="1" smtClean="0">
                 <a:sym typeface="Arial" panose="020B0604020202020204" pitchFamily="34" charset="0"/>
               </a:rPr>
-              <a:t>Extract</a:t>
+              <a:t>Method</a:t>
             </a:r>
             <a:r>
               <a:rPr lang="pt-BR" sz="2800" dirty="0" smtClean="0">
                 <a:sym typeface="Arial" panose="020B0604020202020204" pitchFamily="34" charset="0"/>
               </a:rPr>
-              <a:t> </a:t>
-            </a:r>
-            <a:r>
-              <a:rPr lang="pt-BR" sz="2800" dirty="0" err="1" smtClean="0">
-                <a:sym typeface="Arial" panose="020B0604020202020204" pitchFamily="34" charset="0"/>
-              </a:rPr>
-              <a:t>Method</a:t>
+              <a:t>*</a:t>
             </a:r>
             <a:endParaRPr lang="pt-BR" sz="2800" dirty="0" smtClean="0">
               <a:sym typeface="Arial" panose="020B0604020202020204" pitchFamily="34" charset="0"/>
@@ -41865,6 +41859,12 @@
                 <a:sym typeface="Arial" panose="020B0604020202020204" pitchFamily="34" charset="0"/>
               </a:rPr>
               <a:t>Method</a:t>
+            </a:r>
+            <a:r>
+              <a:rPr lang="pt-BR" sz="2800" dirty="0" smtClean="0">
+                <a:sym typeface="Arial" panose="020B0604020202020204" pitchFamily="34" charset="0"/>
+              </a:rPr>
+              <a:t>*</a:t>
             </a:r>
             <a:endParaRPr lang="pt-BR" sz="2800" dirty="0" smtClean="0">
               <a:sym typeface="Arial" panose="020B0604020202020204" pitchFamily="34" charset="0"/>
@@ -42209,8 +42209,17 @@
               <a:rPr lang="pt-BR" sz="2800" dirty="0" smtClean="0">
                 <a:sym typeface="Arial" panose="020B0604020202020204" pitchFamily="34" charset="0"/>
               </a:rPr>
-              <a:t> Field</a:t>
-            </a:r>
+              <a:t> </a:t>
+            </a:r>
+            <a:r>
+              <a:rPr lang="pt-BR" sz="2800" dirty="0" smtClean="0">
+                <a:sym typeface="Arial" panose="020B0604020202020204" pitchFamily="34" charset="0"/>
+              </a:rPr>
+              <a:t>Field*</a:t>
+            </a:r>
+            <a:endParaRPr lang="pt-BR" sz="2800" dirty="0" smtClean="0">
+              <a:sym typeface="Arial" panose="020B0604020202020204" pitchFamily="34" charset="0"/>
+            </a:endParaRPr>
           </a:p>
           <a:p>
             <a:r>
@@ -42230,6 +42239,12 @@
                 <a:sym typeface="Arial" panose="020B0604020202020204" pitchFamily="34" charset="0"/>
               </a:rPr>
               <a:t>Method</a:t>
+            </a:r>
+            <a:r>
+              <a:rPr lang="pt-BR" sz="2800" dirty="0" smtClean="0">
+                <a:sym typeface="Arial" panose="020B0604020202020204" pitchFamily="34" charset="0"/>
+              </a:rPr>
+              <a:t>*</a:t>
             </a:r>
             <a:endParaRPr lang="pt-BR" sz="2800" dirty="0" smtClean="0">
               <a:sym typeface="Arial" panose="020B0604020202020204" pitchFamily="34" charset="0"/>
@@ -43485,6 +43500,1112 @@
           <a:chExt cx="0" cy="0"/>
         </a:xfrm>
       </p:grpSpPr>
+      <p:pic>
+        <p:nvPicPr>
+          <p:cNvPr id="77827" name="Picture 2" descr="IASA.png"/>
+          <p:cNvPicPr>
+            <a:picLocks noChangeAspect="1"/>
+          </p:cNvPicPr>
+          <p:nvPr/>
+        </p:nvPicPr>
+        <p:blipFill>
+          <a:blip r:embed="rId2">
+            <a:extLst>
+              <a:ext uri="{28A0092B-C50C-407E-A947-70E740481C1C}">
+                <a14:useLocalDpi xmlns:a14="http://schemas.microsoft.com/office/drawing/2010/main" val="0"/>
+              </a:ext>
+            </a:extLst>
+          </a:blip>
+          <a:srcRect/>
+          <a:stretch>
+            <a:fillRect/>
+          </a:stretch>
+        </p:blipFill>
+        <p:spPr bwMode="auto">
+          <a:xfrm>
+            <a:off x="1679575" y="-136525"/>
+            <a:ext cx="7938" cy="11112"/>
+          </a:xfrm>
+          <a:prstGeom prst="rect">
+            <a:avLst/>
+          </a:prstGeom>
+          <a:noFill/>
+          <a:ln>
+            <a:noFill/>
+          </a:ln>
+          <a:effectLst/>
+          <a:extLst>
+            <a:ext uri="{909E8E84-426E-40DD-AFC4-6F175D3DCCD1}">
+              <a14:hiddenFill xmlns:a14="http://schemas.microsoft.com/office/drawing/2010/main">
+                <a:solidFill>
+                  <a:srgbClr val="FFFFFF"/>
+                </a:solidFill>
+              </a14:hiddenFill>
+            </a:ext>
+            <a:ext uri="{91240B29-F687-4F45-9708-019B960494DF}">
+              <a14:hiddenLine xmlns:a14="http://schemas.microsoft.com/office/drawing/2010/main" w="12700">
+                <a:solidFill>
+                  <a:srgbClr val="000000"/>
+                </a:solidFill>
+                <a:miter lim="0"/>
+                <a:headEnd/>
+                <a:tailEnd/>
+              </a14:hiddenLine>
+            </a:ext>
+            <a:ext uri="{AF507438-7753-43E0-B8FC-AC1667EBCBE1}">
+              <a14:hiddenEffects xmlns:a14="http://schemas.microsoft.com/office/drawing/2010/main">
+                <a:effectLst>
+                  <a:outerShdw dist="35921" dir="2700000" algn="ctr" rotWithShape="0">
+                    <a:srgbClr val="808080"/>
+                  </a:outerShdw>
+                </a:effectLst>
+              </a14:hiddenEffects>
+            </a:ext>
+          </a:extLst>
+        </p:spPr>
+      </p:pic>
+      <p:pic>
+        <p:nvPicPr>
+          <p:cNvPr id="77828" name="Picture 3" descr="IASA.png"/>
+          <p:cNvPicPr>
+            <a:picLocks noChangeAspect="1"/>
+          </p:cNvPicPr>
+          <p:nvPr/>
+        </p:nvPicPr>
+        <p:blipFill>
+          <a:blip r:embed="rId2">
+            <a:extLst>
+              <a:ext uri="{28A0092B-C50C-407E-A947-70E740481C1C}">
+                <a14:useLocalDpi xmlns:a14="http://schemas.microsoft.com/office/drawing/2010/main" val="0"/>
+              </a:ext>
+            </a:extLst>
+          </a:blip>
+          <a:srcRect/>
+          <a:stretch>
+            <a:fillRect/>
+          </a:stretch>
+        </p:blipFill>
+        <p:spPr bwMode="auto">
+          <a:xfrm>
+            <a:off x="1830388" y="15875"/>
+            <a:ext cx="11112" cy="7938"/>
+          </a:xfrm>
+          <a:prstGeom prst="rect">
+            <a:avLst/>
+          </a:prstGeom>
+          <a:noFill/>
+          <a:ln>
+            <a:noFill/>
+          </a:ln>
+          <a:effectLst/>
+          <a:extLst>
+            <a:ext uri="{909E8E84-426E-40DD-AFC4-6F175D3DCCD1}">
+              <a14:hiddenFill xmlns:a14="http://schemas.microsoft.com/office/drawing/2010/main">
+                <a:solidFill>
+                  <a:srgbClr val="FFFFFF"/>
+                </a:solidFill>
+              </a14:hiddenFill>
+            </a:ext>
+            <a:ext uri="{91240B29-F687-4F45-9708-019B960494DF}">
+              <a14:hiddenLine xmlns:a14="http://schemas.microsoft.com/office/drawing/2010/main" w="12700">
+                <a:solidFill>
+                  <a:srgbClr val="000000"/>
+                </a:solidFill>
+                <a:miter lim="0"/>
+                <a:headEnd/>
+                <a:tailEnd/>
+              </a14:hiddenLine>
+            </a:ext>
+            <a:ext uri="{AF507438-7753-43E0-B8FC-AC1667EBCBE1}">
+              <a14:hiddenEffects xmlns:a14="http://schemas.microsoft.com/office/drawing/2010/main">
+                <a:effectLst>
+                  <a:outerShdw dist="35921" dir="2700000" algn="ctr" rotWithShape="0">
+                    <a:srgbClr val="808080"/>
+                  </a:outerShdw>
+                </a:effectLst>
+              </a14:hiddenEffects>
+            </a:ext>
+          </a:extLst>
+        </p:spPr>
+      </p:pic>
+      <p:pic>
+        <p:nvPicPr>
+          <p:cNvPr id="77829" name="Picture 4" descr="IASA.png"/>
+          <p:cNvPicPr>
+            <a:picLocks noChangeAspect="1"/>
+          </p:cNvPicPr>
+          <p:nvPr/>
+        </p:nvPicPr>
+        <p:blipFill>
+          <a:blip r:embed="rId2">
+            <a:extLst>
+              <a:ext uri="{28A0092B-C50C-407E-A947-70E740481C1C}">
+                <a14:useLocalDpi xmlns:a14="http://schemas.microsoft.com/office/drawing/2010/main" val="0"/>
+              </a:ext>
+            </a:extLst>
+          </a:blip>
+          <a:srcRect/>
+          <a:stretch>
+            <a:fillRect/>
+          </a:stretch>
+        </p:blipFill>
+        <p:spPr bwMode="auto">
+          <a:xfrm>
+            <a:off x="1679576" y="-234950"/>
+            <a:ext cx="1598613" cy="492125"/>
+          </a:xfrm>
+          <a:prstGeom prst="rect">
+            <a:avLst/>
+          </a:prstGeom>
+          <a:noFill/>
+          <a:ln>
+            <a:noFill/>
+          </a:ln>
+          <a:effectLst/>
+          <a:extLst>
+            <a:ext uri="{909E8E84-426E-40DD-AFC4-6F175D3DCCD1}">
+              <a14:hiddenFill xmlns:a14="http://schemas.microsoft.com/office/drawing/2010/main">
+                <a:solidFill>
+                  <a:srgbClr val="FFFFFF"/>
+                </a:solidFill>
+              </a14:hiddenFill>
+            </a:ext>
+            <a:ext uri="{91240B29-F687-4F45-9708-019B960494DF}">
+              <a14:hiddenLine xmlns:a14="http://schemas.microsoft.com/office/drawing/2010/main" w="12700">
+                <a:solidFill>
+                  <a:srgbClr val="000000"/>
+                </a:solidFill>
+                <a:miter lim="0"/>
+                <a:headEnd/>
+                <a:tailEnd/>
+              </a14:hiddenLine>
+            </a:ext>
+            <a:ext uri="{AF507438-7753-43E0-B8FC-AC1667EBCBE1}">
+              <a14:hiddenEffects xmlns:a14="http://schemas.microsoft.com/office/drawing/2010/main">
+                <a:effectLst>
+                  <a:outerShdw dist="35921" dir="2700000" algn="ctr" rotWithShape="0">
+                    <a:srgbClr val="808080"/>
+                  </a:outerShdw>
+                </a:effectLst>
+              </a14:hiddenEffects>
+            </a:ext>
+          </a:extLst>
+        </p:spPr>
+      </p:pic>
+      <p:pic>
+        <p:nvPicPr>
+          <p:cNvPr id="77830" name="Picture 5" descr="IASA.png"/>
+          <p:cNvPicPr>
+            <a:picLocks noChangeAspect="1"/>
+          </p:cNvPicPr>
+          <p:nvPr/>
+        </p:nvPicPr>
+        <p:blipFill>
+          <a:blip r:embed="rId2">
+            <a:extLst>
+              <a:ext uri="{28A0092B-C50C-407E-A947-70E740481C1C}">
+                <a14:useLocalDpi xmlns:a14="http://schemas.microsoft.com/office/drawing/2010/main" val="0"/>
+              </a:ext>
+            </a:extLst>
+          </a:blip>
+          <a:srcRect/>
+          <a:stretch>
+            <a:fillRect/>
+          </a:stretch>
+        </p:blipFill>
+        <p:spPr bwMode="auto">
+          <a:xfrm>
+            <a:off x="1830389" y="-84138"/>
+            <a:ext cx="1601787" cy="495301"/>
+          </a:xfrm>
+          <a:prstGeom prst="rect">
+            <a:avLst/>
+          </a:prstGeom>
+          <a:noFill/>
+          <a:ln>
+            <a:noFill/>
+          </a:ln>
+          <a:effectLst/>
+          <a:extLst>
+            <a:ext uri="{909E8E84-426E-40DD-AFC4-6F175D3DCCD1}">
+              <a14:hiddenFill xmlns:a14="http://schemas.microsoft.com/office/drawing/2010/main">
+                <a:solidFill>
+                  <a:srgbClr val="FFFFFF"/>
+                </a:solidFill>
+              </a14:hiddenFill>
+            </a:ext>
+            <a:ext uri="{91240B29-F687-4F45-9708-019B960494DF}">
+              <a14:hiddenLine xmlns:a14="http://schemas.microsoft.com/office/drawing/2010/main" w="12700">
+                <a:solidFill>
+                  <a:srgbClr val="000000"/>
+                </a:solidFill>
+                <a:miter lim="0"/>
+                <a:headEnd/>
+                <a:tailEnd/>
+              </a14:hiddenLine>
+            </a:ext>
+            <a:ext uri="{AF507438-7753-43E0-B8FC-AC1667EBCBE1}">
+              <a14:hiddenEffects xmlns:a14="http://schemas.microsoft.com/office/drawing/2010/main">
+                <a:effectLst>
+                  <a:outerShdw dist="35921" dir="2700000" algn="ctr" rotWithShape="0">
+                    <a:srgbClr val="808080"/>
+                  </a:outerShdw>
+                </a:effectLst>
+              </a14:hiddenEffects>
+            </a:ext>
+          </a:extLst>
+        </p:spPr>
+      </p:pic>
+      <p:pic>
+        <p:nvPicPr>
+          <p:cNvPr id="77831" name="Picture 6" descr="IASA.png"/>
+          <p:cNvPicPr>
+            <a:picLocks noChangeAspect="1"/>
+          </p:cNvPicPr>
+          <p:nvPr/>
+        </p:nvPicPr>
+        <p:blipFill>
+          <a:blip r:embed="rId2">
+            <a:extLst>
+              <a:ext uri="{28A0092B-C50C-407E-A947-70E740481C1C}">
+                <a14:useLocalDpi xmlns:a14="http://schemas.microsoft.com/office/drawing/2010/main" val="0"/>
+              </a:ext>
+            </a:extLst>
+          </a:blip>
+          <a:srcRect/>
+          <a:stretch>
+            <a:fillRect/>
+          </a:stretch>
+        </p:blipFill>
+        <p:spPr bwMode="auto">
+          <a:xfrm>
+            <a:off x="1984375" y="68263"/>
+            <a:ext cx="1600200" cy="493712"/>
+          </a:xfrm>
+          <a:prstGeom prst="rect">
+            <a:avLst/>
+          </a:prstGeom>
+          <a:noFill/>
+          <a:ln>
+            <a:noFill/>
+          </a:ln>
+          <a:effectLst/>
+          <a:extLst>
+            <a:ext uri="{909E8E84-426E-40DD-AFC4-6F175D3DCCD1}">
+              <a14:hiddenFill xmlns:a14="http://schemas.microsoft.com/office/drawing/2010/main">
+                <a:solidFill>
+                  <a:srgbClr val="FFFFFF"/>
+                </a:solidFill>
+              </a14:hiddenFill>
+            </a:ext>
+            <a:ext uri="{91240B29-F687-4F45-9708-019B960494DF}">
+              <a14:hiddenLine xmlns:a14="http://schemas.microsoft.com/office/drawing/2010/main" w="12700">
+                <a:solidFill>
+                  <a:srgbClr val="000000"/>
+                </a:solidFill>
+                <a:miter lim="0"/>
+                <a:headEnd/>
+                <a:tailEnd/>
+              </a14:hiddenLine>
+            </a:ext>
+            <a:ext uri="{AF507438-7753-43E0-B8FC-AC1667EBCBE1}">
+              <a14:hiddenEffects xmlns:a14="http://schemas.microsoft.com/office/drawing/2010/main">
+                <a:effectLst>
+                  <a:outerShdw dist="35921" dir="2700000" algn="ctr" rotWithShape="0">
+                    <a:srgbClr val="808080"/>
+                  </a:outerShdw>
+                </a:effectLst>
+              </a14:hiddenEffects>
+            </a:ext>
+          </a:extLst>
+        </p:spPr>
+      </p:pic>
+      <p:sp>
+        <p:nvSpPr>
+          <p:cNvPr id="2" name="Título 1"/>
+          <p:cNvSpPr>
+            <a:spLocks noGrp="1"/>
+          </p:cNvSpPr>
+          <p:nvPr>
+            <p:ph type="title"/>
+          </p:nvPr>
+        </p:nvSpPr>
+        <p:spPr/>
+        <p:txBody>
+          <a:bodyPr/>
+          <a:lstStyle/>
+          <a:p>
+            <a:r>
+              <a:rPr lang="pt-BR" dirty="0">
+                <a:solidFill>
+                  <a:srgbClr val="FFFFFF"/>
+                </a:solidFill>
+                <a:sym typeface="Arial" panose="020B0604020202020204" pitchFamily="34" charset="0"/>
+              </a:rPr>
+              <a:t>Vamos </a:t>
+            </a:r>
+            <a:r>
+              <a:rPr lang="pt-BR" dirty="0" err="1">
+                <a:solidFill>
+                  <a:srgbClr val="FFFFFF"/>
+                </a:solidFill>
+                <a:sym typeface="Arial" panose="020B0604020202020204" pitchFamily="34" charset="0"/>
+              </a:rPr>
+              <a:t>Refatorar</a:t>
+            </a:r>
+            <a:endParaRPr lang="pt-BR" dirty="0"/>
+          </a:p>
+        </p:txBody>
+      </p:sp>
+      <p:sp>
+        <p:nvSpPr>
+          <p:cNvPr id="3" name="Retângulo 2"/>
+          <p:cNvSpPr/>
+          <p:nvPr/>
+        </p:nvSpPr>
+        <p:spPr>
+          <a:xfrm>
+            <a:off x="279314" y="1879600"/>
+            <a:ext cx="11805920" cy="4349302"/>
+          </a:xfrm>
+          <a:prstGeom prst="rect">
+            <a:avLst/>
+          </a:prstGeom>
+          <a:noFill/>
+          <a:ln>
+            <a:noFill/>
+          </a:ln>
+          <a:extLst>
+            <a:ext uri="{909E8E84-426E-40DD-AFC4-6F175D3DCCD1}">
+              <a14:hiddenFill xmlns:a14="http://schemas.microsoft.com/office/drawing/2010/main">
+                <a:solidFill>
+                  <a:srgbClr val="FFFFFF"/>
+                </a:solidFill>
+              </a14:hiddenFill>
+            </a:ext>
+            <a:ext uri="{91240B29-F687-4F45-9708-019B960494DF}">
+              <a14:hiddenLine xmlns:a14="http://schemas.microsoft.com/office/drawing/2010/main" w="9525">
+                <a:solidFill>
+                  <a:srgbClr val="000000"/>
+                </a:solidFill>
+                <a:miter lim="800000"/>
+                <a:headEnd/>
+                <a:tailEnd/>
+              </a14:hiddenLine>
+            </a:ext>
+          </a:extLst>
+        </p:spPr>
+        <p:txBody>
+          <a:bodyPr vert="horz" wrap="square" lIns="88896" tIns="50798" rIns="88896" bIns="50798" numCol="1" anchor="t" anchorCtr="0" compatLnSpc="1">
+            <a:prstTxWarp prst="textNoShape">
+              <a:avLst/>
+            </a:prstTxWarp>
+            <a:noAutofit/>
+          </a:bodyPr>
+          <a:lstStyle/>
+          <a:p>
+            <a:pPr>
+              <a:lnSpc>
+                <a:spcPct val="150000"/>
+              </a:lnSpc>
+              <a:spcBef>
+                <a:spcPct val="30000"/>
+              </a:spcBef>
+              <a:spcAft>
+                <a:spcPts val="1200"/>
+              </a:spcAft>
+              <a:buFont typeface="Arial" charset="0"/>
+              <a:buNone/>
+            </a:pPr>
+            <a:r>
+              <a:rPr lang="pt-BR" dirty="0">
+                <a:solidFill>
+                  <a:schemeClr val="bg1">
+                    <a:lumMod val="50000"/>
+                  </a:schemeClr>
+                </a:solidFill>
+                <a:latin typeface="+mn-lt"/>
+                <a:cs typeface="+mn-cs"/>
+              </a:rPr>
+              <a:t>Classe Ação com mais de uma </a:t>
+            </a:r>
+            <a:r>
+              <a:rPr lang="pt-BR" dirty="0" smtClean="0">
+                <a:solidFill>
+                  <a:schemeClr val="bg1">
+                    <a:lumMod val="50000"/>
+                  </a:schemeClr>
+                </a:solidFill>
+                <a:latin typeface="+mn-lt"/>
+                <a:cs typeface="+mn-cs"/>
+              </a:rPr>
+              <a:t>responsabilidade:  </a:t>
+            </a:r>
+            <a:r>
+              <a:rPr lang="pt-BR" dirty="0" err="1">
+                <a:solidFill>
+                  <a:schemeClr val="bg1">
+                    <a:lumMod val="50000"/>
+                  </a:schemeClr>
+                </a:solidFill>
+                <a:latin typeface="+mn-lt"/>
+                <a:cs typeface="+mn-cs"/>
+              </a:rPr>
+              <a:t>Extract</a:t>
+            </a:r>
+            <a:r>
+              <a:rPr lang="pt-BR" dirty="0">
+                <a:solidFill>
+                  <a:schemeClr val="bg1">
+                    <a:lumMod val="50000"/>
+                  </a:schemeClr>
+                </a:solidFill>
+                <a:latin typeface="+mn-lt"/>
+                <a:cs typeface="+mn-cs"/>
+              </a:rPr>
+              <a:t> </a:t>
+            </a:r>
+            <a:r>
+              <a:rPr lang="pt-BR" dirty="0" err="1">
+                <a:solidFill>
+                  <a:schemeClr val="bg1">
+                    <a:lumMod val="50000"/>
+                  </a:schemeClr>
+                </a:solidFill>
+                <a:latin typeface="+mn-lt"/>
+                <a:cs typeface="+mn-cs"/>
+              </a:rPr>
+              <a:t>Class</a:t>
+            </a:r>
+            <a:r>
+              <a:rPr lang="pt-BR" dirty="0">
+                <a:solidFill>
+                  <a:schemeClr val="bg1">
+                    <a:lumMod val="50000"/>
+                  </a:schemeClr>
+                </a:solidFill>
+                <a:latin typeface="+mn-lt"/>
+                <a:cs typeface="+mn-cs"/>
+              </a:rPr>
+              <a:t> </a:t>
+            </a:r>
+            <a:r>
+              <a:rPr lang="pt-BR" dirty="0" err="1" smtClean="0">
+                <a:solidFill>
+                  <a:schemeClr val="bg1">
+                    <a:lumMod val="50000"/>
+                  </a:schemeClr>
+                </a:solidFill>
+                <a:latin typeface="+mn-lt"/>
+                <a:cs typeface="+mn-cs"/>
+              </a:rPr>
+              <a:t>Refactoring</a:t>
+            </a:r>
+            <a:endParaRPr lang="pt-BR" dirty="0">
+              <a:solidFill>
+                <a:schemeClr val="bg1">
+                  <a:lumMod val="50000"/>
+                </a:schemeClr>
+              </a:solidFill>
+              <a:latin typeface="+mn-lt"/>
+              <a:cs typeface="+mn-cs"/>
+            </a:endParaRPr>
+          </a:p>
+          <a:p>
+            <a:pPr>
+              <a:lnSpc>
+                <a:spcPct val="150000"/>
+              </a:lnSpc>
+              <a:spcBef>
+                <a:spcPct val="30000"/>
+              </a:spcBef>
+              <a:spcAft>
+                <a:spcPts val="1200"/>
+              </a:spcAft>
+              <a:buFont typeface="Arial" charset="0"/>
+              <a:buNone/>
+            </a:pPr>
+            <a:r>
+              <a:rPr lang="pt-BR" dirty="0">
+                <a:solidFill>
+                  <a:schemeClr val="bg1">
+                    <a:lumMod val="50000"/>
+                  </a:schemeClr>
+                </a:solidFill>
+                <a:latin typeface="+mn-lt"/>
+                <a:cs typeface="+mn-cs"/>
+              </a:rPr>
+              <a:t>Classe Empresa possui o método adicionar ação com mais de uma </a:t>
+            </a:r>
+            <a:r>
+              <a:rPr lang="pt-BR" dirty="0" smtClean="0">
+                <a:solidFill>
+                  <a:schemeClr val="bg1">
+                    <a:lumMod val="50000"/>
+                  </a:schemeClr>
+                </a:solidFill>
+                <a:latin typeface="+mn-lt"/>
+                <a:cs typeface="+mn-cs"/>
+              </a:rPr>
+              <a:t>responsabilidade: </a:t>
+            </a:r>
+            <a:r>
+              <a:rPr lang="pt-BR" dirty="0" err="1" smtClean="0">
+                <a:solidFill>
+                  <a:schemeClr val="bg1">
+                    <a:lumMod val="50000"/>
+                  </a:schemeClr>
+                </a:solidFill>
+                <a:latin typeface="+mn-lt"/>
+                <a:cs typeface="+mn-cs"/>
+              </a:rPr>
+              <a:t>Extract</a:t>
+            </a:r>
+            <a:r>
+              <a:rPr lang="pt-BR" dirty="0" smtClean="0">
+                <a:solidFill>
+                  <a:schemeClr val="bg1">
+                    <a:lumMod val="50000"/>
+                  </a:schemeClr>
+                </a:solidFill>
+                <a:latin typeface="+mn-lt"/>
+                <a:cs typeface="+mn-cs"/>
+              </a:rPr>
+              <a:t> </a:t>
+            </a:r>
+            <a:r>
+              <a:rPr lang="pt-BR" dirty="0" err="1">
+                <a:solidFill>
+                  <a:schemeClr val="bg1">
+                    <a:lumMod val="50000"/>
+                  </a:schemeClr>
+                </a:solidFill>
+                <a:latin typeface="+mn-lt"/>
+                <a:cs typeface="+mn-cs"/>
+              </a:rPr>
+              <a:t>Method</a:t>
+            </a:r>
+            <a:r>
+              <a:rPr lang="pt-BR" dirty="0">
+                <a:solidFill>
+                  <a:schemeClr val="bg1">
+                    <a:lumMod val="50000"/>
+                  </a:schemeClr>
+                </a:solidFill>
+                <a:latin typeface="+mn-lt"/>
+                <a:cs typeface="+mn-cs"/>
+              </a:rPr>
+              <a:t> </a:t>
+            </a:r>
+            <a:r>
+              <a:rPr lang="pt-BR" dirty="0" err="1" smtClean="0">
+                <a:solidFill>
+                  <a:schemeClr val="bg1">
+                    <a:lumMod val="50000"/>
+                  </a:schemeClr>
+                </a:solidFill>
+                <a:latin typeface="+mn-lt"/>
+                <a:cs typeface="+mn-cs"/>
+              </a:rPr>
+              <a:t>Refactoring</a:t>
+            </a:r>
+            <a:endParaRPr lang="pt-BR" dirty="0">
+              <a:solidFill>
+                <a:schemeClr val="bg1">
+                  <a:lumMod val="50000"/>
+                </a:schemeClr>
+              </a:solidFill>
+              <a:latin typeface="+mn-lt"/>
+              <a:cs typeface="+mn-cs"/>
+            </a:endParaRPr>
+          </a:p>
+          <a:p>
+            <a:pPr>
+              <a:lnSpc>
+                <a:spcPct val="150000"/>
+              </a:lnSpc>
+              <a:spcBef>
+                <a:spcPct val="30000"/>
+              </a:spcBef>
+              <a:spcAft>
+                <a:spcPts val="1200"/>
+              </a:spcAft>
+              <a:buFont typeface="Arial" charset="0"/>
+              <a:buNone/>
+            </a:pPr>
+            <a:r>
+              <a:rPr lang="pt-BR" dirty="0">
+                <a:solidFill>
+                  <a:schemeClr val="bg1">
+                    <a:lumMod val="50000"/>
+                  </a:schemeClr>
+                </a:solidFill>
+                <a:latin typeface="+mn-lt"/>
+                <a:cs typeface="+mn-cs"/>
+              </a:rPr>
+              <a:t>Após extrair método  no método adicionar ação, a visibilidade não ficou </a:t>
+            </a:r>
+            <a:r>
+              <a:rPr lang="pt-BR" dirty="0" smtClean="0">
+                <a:solidFill>
+                  <a:schemeClr val="bg1">
+                    <a:lumMod val="50000"/>
+                  </a:schemeClr>
+                </a:solidFill>
+                <a:latin typeface="+mn-lt"/>
+                <a:cs typeface="+mn-cs"/>
+              </a:rPr>
+              <a:t>adequada: </a:t>
+            </a:r>
+            <a:r>
+              <a:rPr lang="pt-BR" dirty="0" err="1" smtClean="0">
+                <a:solidFill>
+                  <a:schemeClr val="bg1">
+                    <a:lumMod val="50000"/>
+                  </a:schemeClr>
+                </a:solidFill>
+                <a:latin typeface="+mn-lt"/>
+                <a:cs typeface="+mn-cs"/>
+              </a:rPr>
+              <a:t>Hide</a:t>
+            </a:r>
+            <a:r>
+              <a:rPr lang="pt-BR" dirty="0" smtClean="0">
+                <a:solidFill>
+                  <a:schemeClr val="bg1">
+                    <a:lumMod val="50000"/>
+                  </a:schemeClr>
+                </a:solidFill>
+                <a:latin typeface="+mn-lt"/>
+                <a:cs typeface="+mn-cs"/>
+              </a:rPr>
+              <a:t> </a:t>
+            </a:r>
+            <a:r>
+              <a:rPr lang="pt-BR" dirty="0" err="1">
+                <a:solidFill>
+                  <a:schemeClr val="bg1">
+                    <a:lumMod val="50000"/>
+                  </a:schemeClr>
+                </a:solidFill>
+                <a:latin typeface="+mn-lt"/>
+                <a:cs typeface="+mn-cs"/>
+              </a:rPr>
+              <a:t>Method</a:t>
+            </a:r>
+            <a:r>
+              <a:rPr lang="pt-BR" dirty="0">
+                <a:solidFill>
+                  <a:schemeClr val="bg1">
+                    <a:lumMod val="50000"/>
+                  </a:schemeClr>
+                </a:solidFill>
+                <a:latin typeface="+mn-lt"/>
+                <a:cs typeface="+mn-cs"/>
+              </a:rPr>
+              <a:t> </a:t>
+            </a:r>
+            <a:r>
+              <a:rPr lang="pt-BR" dirty="0" err="1" smtClean="0">
+                <a:solidFill>
+                  <a:schemeClr val="bg1">
+                    <a:lumMod val="50000"/>
+                  </a:schemeClr>
+                </a:solidFill>
+                <a:latin typeface="+mn-lt"/>
+                <a:cs typeface="+mn-cs"/>
+              </a:rPr>
+              <a:t>Refactoring</a:t>
+            </a:r>
+            <a:endParaRPr lang="pt-BR" dirty="0">
+              <a:solidFill>
+                <a:schemeClr val="bg1">
+                  <a:lumMod val="50000"/>
+                </a:schemeClr>
+              </a:solidFill>
+              <a:latin typeface="+mn-lt"/>
+              <a:cs typeface="+mn-cs"/>
+            </a:endParaRPr>
+          </a:p>
+          <a:p>
+            <a:pPr>
+              <a:lnSpc>
+                <a:spcPct val="150000"/>
+              </a:lnSpc>
+              <a:spcBef>
+                <a:spcPct val="30000"/>
+              </a:spcBef>
+              <a:spcAft>
+                <a:spcPts val="1200"/>
+              </a:spcAft>
+              <a:buFont typeface="Arial" charset="0"/>
+              <a:buNone/>
+            </a:pPr>
+            <a:r>
+              <a:rPr lang="pt-BR" dirty="0">
+                <a:solidFill>
+                  <a:schemeClr val="bg1">
+                    <a:lumMod val="50000"/>
+                  </a:schemeClr>
+                </a:solidFill>
+                <a:latin typeface="+mn-lt"/>
+                <a:cs typeface="+mn-cs"/>
+              </a:rPr>
+              <a:t>Nomes de métodos da classe Carteira, não estão </a:t>
+            </a:r>
+            <a:r>
+              <a:rPr lang="pt-BR" dirty="0" smtClean="0">
+                <a:solidFill>
+                  <a:schemeClr val="bg1">
+                    <a:lumMod val="50000"/>
+                  </a:schemeClr>
+                </a:solidFill>
+                <a:latin typeface="+mn-lt"/>
+                <a:cs typeface="+mn-cs"/>
+              </a:rPr>
+              <a:t>adequados: </a:t>
+            </a:r>
+            <a:r>
+              <a:rPr lang="pt-BR" dirty="0" err="1" smtClean="0">
+                <a:solidFill>
+                  <a:schemeClr val="bg1">
+                    <a:lumMod val="50000"/>
+                  </a:schemeClr>
+                </a:solidFill>
+                <a:latin typeface="+mn-lt"/>
+                <a:cs typeface="+mn-cs"/>
+              </a:rPr>
+              <a:t>Rename</a:t>
+            </a:r>
+            <a:r>
+              <a:rPr lang="pt-BR" dirty="0" smtClean="0">
+                <a:solidFill>
+                  <a:schemeClr val="bg1">
+                    <a:lumMod val="50000"/>
+                  </a:schemeClr>
+                </a:solidFill>
+                <a:latin typeface="+mn-lt"/>
+                <a:cs typeface="+mn-cs"/>
+              </a:rPr>
+              <a:t> </a:t>
+            </a:r>
+            <a:r>
+              <a:rPr lang="pt-BR" dirty="0" err="1">
+                <a:solidFill>
+                  <a:schemeClr val="bg1">
+                    <a:lumMod val="50000"/>
+                  </a:schemeClr>
+                </a:solidFill>
+                <a:latin typeface="+mn-lt"/>
+                <a:cs typeface="+mn-cs"/>
+              </a:rPr>
+              <a:t>Method</a:t>
+            </a:r>
+            <a:r>
+              <a:rPr lang="pt-BR" dirty="0">
+                <a:solidFill>
+                  <a:schemeClr val="bg1">
+                    <a:lumMod val="50000"/>
+                  </a:schemeClr>
+                </a:solidFill>
+                <a:latin typeface="+mn-lt"/>
+                <a:cs typeface="+mn-cs"/>
+              </a:rPr>
+              <a:t> </a:t>
+            </a:r>
+            <a:r>
+              <a:rPr lang="pt-BR" dirty="0" err="1">
+                <a:solidFill>
+                  <a:schemeClr val="bg1">
+                    <a:lumMod val="50000"/>
+                  </a:schemeClr>
+                </a:solidFill>
+                <a:latin typeface="+mn-lt"/>
+                <a:cs typeface="+mn-cs"/>
+              </a:rPr>
+              <a:t>Refactoring</a:t>
+            </a:r>
+            <a:endParaRPr lang="pt-BR" dirty="0">
+              <a:solidFill>
+                <a:schemeClr val="bg1">
+                  <a:lumMod val="50000"/>
+                </a:schemeClr>
+              </a:solidFill>
+              <a:latin typeface="+mn-lt"/>
+              <a:cs typeface="+mn-cs"/>
+            </a:endParaRPr>
+          </a:p>
+          <a:p>
+            <a:pPr>
+              <a:lnSpc>
+                <a:spcPct val="150000"/>
+              </a:lnSpc>
+              <a:spcBef>
+                <a:spcPct val="30000"/>
+              </a:spcBef>
+              <a:spcAft>
+                <a:spcPts val="1200"/>
+              </a:spcAft>
+              <a:buFont typeface="Arial" charset="0"/>
+              <a:buNone/>
+            </a:pPr>
+            <a:r>
+              <a:rPr lang="pt-BR" dirty="0">
+                <a:solidFill>
+                  <a:schemeClr val="bg1">
+                    <a:lumMod val="50000"/>
+                  </a:schemeClr>
+                </a:solidFill>
+                <a:latin typeface="+mn-lt"/>
+                <a:cs typeface="+mn-cs"/>
+              </a:rPr>
+              <a:t>Classe Operação está violando encapsulamento (</a:t>
+            </a:r>
+            <a:r>
+              <a:rPr lang="pt-BR" dirty="0" err="1">
+                <a:solidFill>
+                  <a:schemeClr val="bg1">
+                    <a:lumMod val="50000"/>
+                  </a:schemeClr>
+                </a:solidFill>
+                <a:latin typeface="+mn-lt"/>
+                <a:cs typeface="+mn-cs"/>
+              </a:rPr>
+              <a:t>Encapsulate</a:t>
+            </a:r>
+            <a:r>
+              <a:rPr lang="pt-BR" dirty="0">
+                <a:solidFill>
+                  <a:schemeClr val="bg1">
+                    <a:lumMod val="50000"/>
+                  </a:schemeClr>
+                </a:solidFill>
+                <a:latin typeface="+mn-lt"/>
+                <a:cs typeface="+mn-cs"/>
+              </a:rPr>
+              <a:t> Field </a:t>
+            </a:r>
+            <a:r>
+              <a:rPr lang="pt-BR" dirty="0" err="1">
+                <a:solidFill>
+                  <a:schemeClr val="bg1">
+                    <a:lumMod val="50000"/>
+                  </a:schemeClr>
+                </a:solidFill>
+                <a:latin typeface="+mn-lt"/>
+                <a:cs typeface="+mn-cs"/>
+              </a:rPr>
+              <a:t>Refactoring</a:t>
+            </a:r>
+            <a:r>
+              <a:rPr lang="pt-BR" dirty="0">
+                <a:solidFill>
+                  <a:schemeClr val="bg1">
+                    <a:lumMod val="50000"/>
+                  </a:schemeClr>
+                </a:solidFill>
+                <a:latin typeface="+mn-lt"/>
+                <a:cs typeface="+mn-cs"/>
+              </a:rPr>
+              <a:t>)</a:t>
+            </a:r>
+          </a:p>
+          <a:p>
+            <a:pPr>
+              <a:lnSpc>
+                <a:spcPct val="150000"/>
+              </a:lnSpc>
+              <a:spcBef>
+                <a:spcPct val="30000"/>
+              </a:spcBef>
+              <a:spcAft>
+                <a:spcPts val="1200"/>
+              </a:spcAft>
+              <a:buFont typeface="Arial" charset="0"/>
+              <a:buNone/>
+            </a:pPr>
+            <a:r>
+              <a:rPr lang="pt-BR" dirty="0">
+                <a:solidFill>
+                  <a:schemeClr val="bg1">
+                    <a:lumMod val="50000"/>
+                  </a:schemeClr>
+                </a:solidFill>
+                <a:latin typeface="+mn-lt"/>
+                <a:cs typeface="+mn-cs"/>
+              </a:rPr>
+              <a:t>Carteira possui uma responsabilidade que não lhe </a:t>
+            </a:r>
+            <a:r>
+              <a:rPr lang="pt-BR" dirty="0" err="1">
+                <a:solidFill>
+                  <a:schemeClr val="bg1">
+                    <a:lumMod val="50000"/>
+                  </a:schemeClr>
+                </a:solidFill>
+                <a:latin typeface="+mn-lt"/>
+                <a:cs typeface="+mn-cs"/>
+              </a:rPr>
+              <a:t>pertece</a:t>
+            </a:r>
+            <a:r>
+              <a:rPr lang="pt-BR" dirty="0">
+                <a:solidFill>
+                  <a:schemeClr val="bg1">
+                    <a:lumMod val="50000"/>
+                  </a:schemeClr>
+                </a:solidFill>
+                <a:latin typeface="+mn-lt"/>
+                <a:cs typeface="+mn-cs"/>
+              </a:rPr>
+              <a:t>, calcular </a:t>
+            </a:r>
+            <a:r>
+              <a:rPr lang="pt-BR" dirty="0" smtClean="0">
+                <a:solidFill>
+                  <a:schemeClr val="bg1">
+                    <a:lumMod val="50000"/>
+                  </a:schemeClr>
+                </a:solidFill>
+                <a:latin typeface="+mn-lt"/>
+                <a:cs typeface="+mn-cs"/>
+              </a:rPr>
+              <a:t>corretagem: </a:t>
+            </a:r>
+            <a:r>
+              <a:rPr lang="pt-BR" dirty="0" err="1" smtClean="0">
+                <a:solidFill>
+                  <a:schemeClr val="bg1">
+                    <a:lumMod val="50000"/>
+                  </a:schemeClr>
+                </a:solidFill>
+                <a:latin typeface="+mn-lt"/>
+                <a:cs typeface="+mn-cs"/>
+              </a:rPr>
+              <a:t>Extract</a:t>
+            </a:r>
+            <a:r>
+              <a:rPr lang="pt-BR" dirty="0" smtClean="0">
+                <a:solidFill>
+                  <a:schemeClr val="bg1">
+                    <a:lumMod val="50000"/>
+                  </a:schemeClr>
+                </a:solidFill>
+                <a:latin typeface="+mn-lt"/>
+                <a:cs typeface="+mn-cs"/>
+              </a:rPr>
+              <a:t> </a:t>
+            </a:r>
+            <a:r>
+              <a:rPr lang="pt-BR" dirty="0" err="1">
+                <a:solidFill>
+                  <a:schemeClr val="bg1">
+                    <a:lumMod val="50000"/>
+                  </a:schemeClr>
+                </a:solidFill>
+                <a:latin typeface="+mn-lt"/>
+                <a:cs typeface="+mn-cs"/>
+              </a:rPr>
+              <a:t>Class</a:t>
+            </a:r>
+            <a:r>
+              <a:rPr lang="pt-BR" dirty="0">
+                <a:solidFill>
+                  <a:schemeClr val="bg1">
+                    <a:lumMod val="50000"/>
+                  </a:schemeClr>
+                </a:solidFill>
+                <a:latin typeface="+mn-lt"/>
+                <a:cs typeface="+mn-cs"/>
+              </a:rPr>
+              <a:t> + Move </a:t>
+            </a:r>
+            <a:r>
+              <a:rPr lang="pt-BR" dirty="0" err="1">
+                <a:solidFill>
+                  <a:schemeClr val="bg1">
+                    <a:lumMod val="50000"/>
+                  </a:schemeClr>
+                </a:solidFill>
+                <a:latin typeface="+mn-lt"/>
+                <a:cs typeface="+mn-cs"/>
+              </a:rPr>
+              <a:t>Method</a:t>
+            </a:r>
+            <a:r>
+              <a:rPr lang="pt-BR" dirty="0">
+                <a:solidFill>
+                  <a:schemeClr val="bg1">
+                    <a:lumMod val="50000"/>
+                  </a:schemeClr>
+                </a:solidFill>
+                <a:latin typeface="+mn-lt"/>
+                <a:cs typeface="+mn-cs"/>
+              </a:rPr>
+              <a:t> </a:t>
+            </a:r>
+            <a:r>
+              <a:rPr lang="pt-BR" dirty="0" err="1" smtClean="0">
+                <a:solidFill>
+                  <a:schemeClr val="bg1">
+                    <a:lumMod val="50000"/>
+                  </a:schemeClr>
+                </a:solidFill>
+                <a:latin typeface="+mn-lt"/>
+                <a:cs typeface="+mn-cs"/>
+              </a:rPr>
+              <a:t>refactoring</a:t>
+            </a:r>
+            <a:endParaRPr lang="pt-BR" dirty="0">
+              <a:solidFill>
+                <a:schemeClr val="bg1">
+                  <a:lumMod val="50000"/>
+                </a:schemeClr>
+              </a:solidFill>
+              <a:latin typeface="+mn-lt"/>
+              <a:cs typeface="+mn-cs"/>
+            </a:endParaRPr>
+          </a:p>
+        </p:txBody>
+      </p:sp>
+    </p:spTree>
+    <p:extLst>
+      <p:ext uri="{BB962C8B-B14F-4D97-AF65-F5344CB8AC3E}">
+        <p14:creationId xmlns:p14="http://schemas.microsoft.com/office/powerpoint/2010/main" val="1017215672"/>
+      </p:ext>
+    </p:extLst>
+  </p:cSld>
+  <p:clrMapOvr>
+    <a:masterClrMapping/>
+  </p:clrMapOvr>
+  <p:transition spd="med"/>
+  <p:timing>
+    <p:tnLst>
+      <p:par>
+        <p:cTn id="1" dur="indefinite" restart="never" nodeType="tmRoot"/>
+      </p:par>
+    </p:tnLst>
+  </p:timing>
+</p:sld>
+</file>
+
+<file path=ppt/slides/slide92.xml><?xml version="1.0" encoding="utf-8"?>
+<p:sld xmlns:a="http://schemas.openxmlformats.org/drawingml/2006/main" xmlns:r="http://schemas.openxmlformats.org/officeDocument/2006/relationships" xmlns:p="http://schemas.openxmlformats.org/presentationml/2006/main">
+  <p:cSld>
+    <p:spTree>
+      <p:nvGrpSpPr>
+        <p:cNvPr id="1" name=""/>
+        <p:cNvGrpSpPr/>
+        <p:nvPr/>
+      </p:nvGrpSpPr>
+      <p:grpSpPr>
+        <a:xfrm>
+          <a:off x="0" y="0"/>
+          <a:ext cx="0" cy="0"/>
+          <a:chOff x="0" y="0"/>
+          <a:chExt cx="0" cy="0"/>
+        </a:xfrm>
+      </p:grpSpPr>
       <p:sp>
         <p:nvSpPr>
           <p:cNvPr id="78851" name="Rectangle 2"/>
@@ -43916,7 +45037,7 @@
 </p:sld>
 </file>
 
-<file path=ppt/slides/slide92.xml><?xml version="1.0" encoding="utf-8"?>
+<file path=ppt/slides/slide93.xml><?xml version="1.0" encoding="utf-8"?>
 <p:sld xmlns:a="http://schemas.openxmlformats.org/drawingml/2006/main" xmlns:r="http://schemas.openxmlformats.org/officeDocument/2006/relationships" xmlns:p="http://schemas.openxmlformats.org/presentationml/2006/main">
   <p:cSld>
     <p:spTree>

</xml_diff>

<commit_message>
Solucao Exercicio Aula 3
</commit_message>
<xml_diff>
--- a/ppt/Fundamentos em Arquitetura de Software com C# - Modulo 2.pptx
+++ b/ppt/Fundamentos em Arquitetura de Software com C# - Modulo 2.pptx
@@ -1517,594 +1517,6 @@
       <dsp:cNvGrpSpPr/>
     </dsp:nvGrpSpPr>
     <dsp:grpSpPr/>
-    <dsp:sp modelId="{BDBCD96D-EE08-4676-B252-D2D8DA81DAF8}">
-      <dsp:nvSpPr>
-        <dsp:cNvPr id="0" name=""/>
-        <dsp:cNvSpPr/>
-      </dsp:nvSpPr>
-      <dsp:spPr>
-        <a:xfrm>
-          <a:off x="2515483" y="244"/>
-          <a:ext cx="1490185" cy="1490185"/>
-        </a:xfrm>
-        <a:prstGeom prst="ellipse">
-          <a:avLst/>
-        </a:prstGeom>
-        <a:solidFill>
-          <a:schemeClr val="accent4">
-            <a:hueOff val="0"/>
-            <a:satOff val="0"/>
-            <a:lumOff val="0"/>
-            <a:alphaOff val="0"/>
-          </a:schemeClr>
-        </a:solidFill>
-        <a:ln w="19050" cap="flat" cmpd="sng" algn="ctr">
-          <a:solidFill>
-            <a:schemeClr val="lt1">
-              <a:hueOff val="0"/>
-              <a:satOff val="0"/>
-              <a:lumOff val="0"/>
-              <a:alphaOff val="0"/>
-            </a:schemeClr>
-          </a:solidFill>
-          <a:prstDash val="solid"/>
-          <a:miter lim="800000"/>
-        </a:ln>
-        <a:effectLst/>
-      </dsp:spPr>
-      <dsp:style>
-        <a:lnRef idx="3">
-          <a:scrgbClr r="0" g="0" b="0"/>
-        </a:lnRef>
-        <a:fillRef idx="1">
-          <a:scrgbClr r="0" g="0" b="0"/>
-        </a:fillRef>
-        <a:effectRef idx="1">
-          <a:scrgbClr r="0" g="0" b="0"/>
-        </a:effectRef>
-        <a:fontRef idx="minor">
-          <a:schemeClr val="lt1"/>
-        </a:fontRef>
-      </dsp:style>
-      <dsp:txBody>
-        <a:bodyPr spcFirstLastPara="0" vert="horz" wrap="square" lIns="20320" tIns="20320" rIns="20320" bIns="20320" numCol="1" spcCol="1270" anchor="ctr" anchorCtr="0">
-          <a:noAutofit/>
-        </a:bodyPr>
-        <a:lstStyle/>
-        <a:p>
-          <a:pPr lvl="0" algn="ctr" defTabSz="711200">
-            <a:lnSpc>
-              <a:spcPct val="90000"/>
-            </a:lnSpc>
-            <a:spcBef>
-              <a:spcPct val="0"/>
-            </a:spcBef>
-            <a:spcAft>
-              <a:spcPct val="35000"/>
-            </a:spcAft>
-          </a:pPr>
-          <a:r>
-            <a:rPr lang="pt-BR" sz="1600" kern="1200" dirty="0" smtClean="0"/>
-            <a:t>Criar um teste</a:t>
-          </a:r>
-          <a:endParaRPr lang="pt-BR" sz="1600" kern="1200" dirty="0"/>
-        </a:p>
-      </dsp:txBody>
-      <dsp:txXfrm>
-        <a:off x="2733716" y="218477"/>
-        <a:ext cx="1053719" cy="1053719"/>
-      </dsp:txXfrm>
-    </dsp:sp>
-    <dsp:sp modelId="{F9DF094C-F8FC-4837-AE8D-BC8A4973C1E7}">
-      <dsp:nvSpPr>
-        <dsp:cNvPr id="0" name=""/>
-        <dsp:cNvSpPr/>
-      </dsp:nvSpPr>
-      <dsp:spPr>
-        <a:xfrm rot="2700000">
-          <a:off x="3845767" y="1277374"/>
-          <a:ext cx="396628" cy="502937"/>
-        </a:xfrm>
-        <a:prstGeom prst="rightArrow">
-          <a:avLst>
-            <a:gd name="adj1" fmla="val 60000"/>
-            <a:gd name="adj2" fmla="val 50000"/>
-          </a:avLst>
-        </a:prstGeom>
-        <a:solidFill>
-          <a:schemeClr val="accent4">
-            <a:hueOff val="0"/>
-            <a:satOff val="0"/>
-            <a:lumOff val="0"/>
-            <a:alphaOff val="0"/>
-          </a:schemeClr>
-        </a:solidFill>
-        <a:ln>
-          <a:noFill/>
-        </a:ln>
-        <a:effectLst/>
-      </dsp:spPr>
-      <dsp:style>
-        <a:lnRef idx="0">
-          <a:scrgbClr r="0" g="0" b="0"/>
-        </a:lnRef>
-        <a:fillRef idx="1">
-          <a:scrgbClr r="0" g="0" b="0"/>
-        </a:fillRef>
-        <a:effectRef idx="1">
-          <a:scrgbClr r="0" g="0" b="0"/>
-        </a:effectRef>
-        <a:fontRef idx="minor">
-          <a:schemeClr val="lt1"/>
-        </a:fontRef>
-      </dsp:style>
-      <dsp:txBody>
-        <a:bodyPr spcFirstLastPara="0" vert="horz" wrap="square" lIns="0" tIns="0" rIns="0" bIns="0" numCol="1" spcCol="1270" anchor="ctr" anchorCtr="0">
-          <a:noAutofit/>
-        </a:bodyPr>
-        <a:lstStyle/>
-        <a:p>
-          <a:pPr lvl="0" algn="ctr" defTabSz="577850">
-            <a:lnSpc>
-              <a:spcPct val="90000"/>
-            </a:lnSpc>
-            <a:spcBef>
-              <a:spcPct val="0"/>
-            </a:spcBef>
-            <a:spcAft>
-              <a:spcPct val="35000"/>
-            </a:spcAft>
-          </a:pPr>
-          <a:endParaRPr lang="pt-BR" sz="1300" kern="1200"/>
-        </a:p>
-      </dsp:txBody>
-      <dsp:txXfrm>
-        <a:off x="3863192" y="1335892"/>
-        <a:ext cx="277640" cy="301763"/>
-      </dsp:txXfrm>
-    </dsp:sp>
-    <dsp:sp modelId="{24839DFE-D1DA-41EC-BD3F-4408797FA3B1}">
-      <dsp:nvSpPr>
-        <dsp:cNvPr id="0" name=""/>
-        <dsp:cNvSpPr/>
-      </dsp:nvSpPr>
-      <dsp:spPr>
-        <a:xfrm>
-          <a:off x="4098371" y="1583132"/>
-          <a:ext cx="1490185" cy="1490185"/>
-        </a:xfrm>
-        <a:prstGeom prst="ellipse">
-          <a:avLst/>
-        </a:prstGeom>
-        <a:solidFill>
-          <a:schemeClr val="accent4">
-            <a:hueOff val="3465231"/>
-            <a:satOff val="-15989"/>
-            <a:lumOff val="588"/>
-            <a:alphaOff val="0"/>
-          </a:schemeClr>
-        </a:solidFill>
-        <a:ln w="19050" cap="flat" cmpd="sng" algn="ctr">
-          <a:solidFill>
-            <a:schemeClr val="lt1">
-              <a:hueOff val="0"/>
-              <a:satOff val="0"/>
-              <a:lumOff val="0"/>
-              <a:alphaOff val="0"/>
-            </a:schemeClr>
-          </a:solidFill>
-          <a:prstDash val="solid"/>
-          <a:miter lim="800000"/>
-        </a:ln>
-        <a:effectLst/>
-      </dsp:spPr>
-      <dsp:style>
-        <a:lnRef idx="3">
-          <a:scrgbClr r="0" g="0" b="0"/>
-        </a:lnRef>
-        <a:fillRef idx="1">
-          <a:scrgbClr r="0" g="0" b="0"/>
-        </a:fillRef>
-        <a:effectRef idx="1">
-          <a:scrgbClr r="0" g="0" b="0"/>
-        </a:effectRef>
-        <a:fontRef idx="minor">
-          <a:schemeClr val="lt1"/>
-        </a:fontRef>
-      </dsp:style>
-      <dsp:txBody>
-        <a:bodyPr spcFirstLastPara="0" vert="horz" wrap="square" lIns="20320" tIns="20320" rIns="20320" bIns="20320" numCol="1" spcCol="1270" anchor="ctr" anchorCtr="0">
-          <a:noAutofit/>
-        </a:bodyPr>
-        <a:lstStyle/>
-        <a:p>
-          <a:pPr lvl="0" algn="ctr" defTabSz="711200">
-            <a:lnSpc>
-              <a:spcPct val="90000"/>
-            </a:lnSpc>
-            <a:spcBef>
-              <a:spcPct val="0"/>
-            </a:spcBef>
-            <a:spcAft>
-              <a:spcPct val="35000"/>
-            </a:spcAft>
-          </a:pPr>
-          <a:r>
-            <a:rPr lang="pt-BR" sz="1600" kern="1200" dirty="0" smtClean="0"/>
-            <a:t> Rodar o teste</a:t>
-          </a:r>
-          <a:endParaRPr lang="pt-BR" sz="1600" kern="1200" dirty="0"/>
-        </a:p>
-      </dsp:txBody>
-      <dsp:txXfrm>
-        <a:off x="4316604" y="1801365"/>
-        <a:ext cx="1053719" cy="1053719"/>
-      </dsp:txXfrm>
-    </dsp:sp>
-    <dsp:sp modelId="{0FA284E9-2FB6-4FAA-847E-A7E1101931A8}">
-      <dsp:nvSpPr>
-        <dsp:cNvPr id="0" name=""/>
-        <dsp:cNvSpPr/>
-      </dsp:nvSpPr>
-      <dsp:spPr>
-        <a:xfrm rot="8100000">
-          <a:off x="3861642" y="2860262"/>
-          <a:ext cx="396628" cy="502937"/>
-        </a:xfrm>
-        <a:prstGeom prst="rightArrow">
-          <a:avLst>
-            <a:gd name="adj1" fmla="val 60000"/>
-            <a:gd name="adj2" fmla="val 50000"/>
-          </a:avLst>
-        </a:prstGeom>
-        <a:solidFill>
-          <a:schemeClr val="accent4">
-            <a:hueOff val="3465231"/>
-            <a:satOff val="-15989"/>
-            <a:lumOff val="588"/>
-            <a:alphaOff val="0"/>
-          </a:schemeClr>
-        </a:solidFill>
-        <a:ln>
-          <a:noFill/>
-        </a:ln>
-        <a:effectLst/>
-      </dsp:spPr>
-      <dsp:style>
-        <a:lnRef idx="0">
-          <a:scrgbClr r="0" g="0" b="0"/>
-        </a:lnRef>
-        <a:fillRef idx="1">
-          <a:scrgbClr r="0" g="0" b="0"/>
-        </a:fillRef>
-        <a:effectRef idx="1">
-          <a:scrgbClr r="0" g="0" b="0"/>
-        </a:effectRef>
-        <a:fontRef idx="minor">
-          <a:schemeClr val="lt1"/>
-        </a:fontRef>
-      </dsp:style>
-      <dsp:txBody>
-        <a:bodyPr spcFirstLastPara="0" vert="horz" wrap="square" lIns="0" tIns="0" rIns="0" bIns="0" numCol="1" spcCol="1270" anchor="ctr" anchorCtr="0">
-          <a:noAutofit/>
-        </a:bodyPr>
-        <a:lstStyle/>
-        <a:p>
-          <a:pPr lvl="0" algn="ctr" defTabSz="577850">
-            <a:lnSpc>
-              <a:spcPct val="90000"/>
-            </a:lnSpc>
-            <a:spcBef>
-              <a:spcPct val="0"/>
-            </a:spcBef>
-            <a:spcAft>
-              <a:spcPct val="35000"/>
-            </a:spcAft>
-          </a:pPr>
-          <a:endParaRPr lang="pt-BR" sz="1300" kern="1200"/>
-        </a:p>
-      </dsp:txBody>
-      <dsp:txXfrm rot="10800000">
-        <a:off x="3963205" y="2918780"/>
-        <a:ext cx="277640" cy="301763"/>
-      </dsp:txXfrm>
-    </dsp:sp>
-    <dsp:sp modelId="{755E8FAB-1DB2-4EA3-A03A-7A6F1F79DEE6}">
-      <dsp:nvSpPr>
-        <dsp:cNvPr id="0" name=""/>
-        <dsp:cNvSpPr/>
-      </dsp:nvSpPr>
-      <dsp:spPr>
-        <a:xfrm>
-          <a:off x="2515483" y="3166020"/>
-          <a:ext cx="1490185" cy="1490185"/>
-        </a:xfrm>
-        <a:prstGeom prst="ellipse">
-          <a:avLst/>
-        </a:prstGeom>
-        <a:solidFill>
-          <a:schemeClr val="accent4">
-            <a:hueOff val="6930461"/>
-            <a:satOff val="-31979"/>
-            <a:lumOff val="1177"/>
-            <a:alphaOff val="0"/>
-          </a:schemeClr>
-        </a:solidFill>
-        <a:ln w="19050" cap="flat" cmpd="sng" algn="ctr">
-          <a:solidFill>
-            <a:schemeClr val="lt1">
-              <a:hueOff val="0"/>
-              <a:satOff val="0"/>
-              <a:lumOff val="0"/>
-              <a:alphaOff val="0"/>
-            </a:schemeClr>
-          </a:solidFill>
-          <a:prstDash val="solid"/>
-          <a:miter lim="800000"/>
-        </a:ln>
-        <a:effectLst/>
-      </dsp:spPr>
-      <dsp:style>
-        <a:lnRef idx="3">
-          <a:scrgbClr r="0" g="0" b="0"/>
-        </a:lnRef>
-        <a:fillRef idx="1">
-          <a:scrgbClr r="0" g="0" b="0"/>
-        </a:fillRef>
-        <a:effectRef idx="1">
-          <a:scrgbClr r="0" g="0" b="0"/>
-        </a:effectRef>
-        <a:fontRef idx="minor">
-          <a:schemeClr val="lt1"/>
-        </a:fontRef>
-      </dsp:style>
-      <dsp:txBody>
-        <a:bodyPr spcFirstLastPara="0" vert="horz" wrap="square" lIns="20320" tIns="20320" rIns="20320" bIns="20320" numCol="1" spcCol="1270" anchor="ctr" anchorCtr="0">
-          <a:noAutofit/>
-        </a:bodyPr>
-        <a:lstStyle/>
-        <a:p>
-          <a:pPr lvl="0" algn="ctr" defTabSz="711200">
-            <a:lnSpc>
-              <a:spcPct val="90000"/>
-            </a:lnSpc>
-            <a:spcBef>
-              <a:spcPct val="0"/>
-            </a:spcBef>
-            <a:spcAft>
-              <a:spcPct val="35000"/>
-            </a:spcAft>
-          </a:pPr>
-          <a:r>
-            <a:rPr lang="pt-BR" sz="1600" kern="1200" dirty="0" smtClean="0"/>
-            <a:t>Realizar </a:t>
-          </a:r>
-          <a:r>
-            <a:rPr lang="pt-BR" sz="1600" kern="1200" dirty="0" err="1" smtClean="0"/>
-            <a:t>refactoring</a:t>
-          </a:r>
-          <a:endParaRPr lang="pt-BR" sz="1600" kern="1200" dirty="0"/>
-        </a:p>
-      </dsp:txBody>
-      <dsp:txXfrm>
-        <a:off x="2733716" y="3384253"/>
-        <a:ext cx="1053719" cy="1053719"/>
-      </dsp:txXfrm>
-    </dsp:sp>
-    <dsp:sp modelId="{CF486008-9BC7-4557-9CE7-3F2DF53F750C}">
-      <dsp:nvSpPr>
-        <dsp:cNvPr id="0" name=""/>
-        <dsp:cNvSpPr/>
-      </dsp:nvSpPr>
-      <dsp:spPr>
-        <a:xfrm rot="13500000">
-          <a:off x="2278755" y="2876137"/>
-          <a:ext cx="396628" cy="502937"/>
-        </a:xfrm>
-        <a:prstGeom prst="rightArrow">
-          <a:avLst>
-            <a:gd name="adj1" fmla="val 60000"/>
-            <a:gd name="adj2" fmla="val 50000"/>
-          </a:avLst>
-        </a:prstGeom>
-        <a:solidFill>
-          <a:schemeClr val="accent4">
-            <a:hueOff val="6930461"/>
-            <a:satOff val="-31979"/>
-            <a:lumOff val="1177"/>
-            <a:alphaOff val="0"/>
-          </a:schemeClr>
-        </a:solidFill>
-        <a:ln>
-          <a:noFill/>
-        </a:ln>
-        <a:effectLst/>
-      </dsp:spPr>
-      <dsp:style>
-        <a:lnRef idx="0">
-          <a:scrgbClr r="0" g="0" b="0"/>
-        </a:lnRef>
-        <a:fillRef idx="1">
-          <a:scrgbClr r="0" g="0" b="0"/>
-        </a:fillRef>
-        <a:effectRef idx="1">
-          <a:scrgbClr r="0" g="0" b="0"/>
-        </a:effectRef>
-        <a:fontRef idx="minor">
-          <a:schemeClr val="lt1"/>
-        </a:fontRef>
-      </dsp:style>
-      <dsp:txBody>
-        <a:bodyPr spcFirstLastPara="0" vert="horz" wrap="square" lIns="0" tIns="0" rIns="0" bIns="0" numCol="1" spcCol="1270" anchor="ctr" anchorCtr="0">
-          <a:noAutofit/>
-        </a:bodyPr>
-        <a:lstStyle/>
-        <a:p>
-          <a:pPr lvl="0" algn="ctr" defTabSz="577850">
-            <a:lnSpc>
-              <a:spcPct val="90000"/>
-            </a:lnSpc>
-            <a:spcBef>
-              <a:spcPct val="0"/>
-            </a:spcBef>
-            <a:spcAft>
-              <a:spcPct val="35000"/>
-            </a:spcAft>
-          </a:pPr>
-          <a:endParaRPr lang="pt-BR" sz="1300" kern="1200"/>
-        </a:p>
-      </dsp:txBody>
-      <dsp:txXfrm rot="10800000">
-        <a:off x="2380318" y="3018793"/>
-        <a:ext cx="277640" cy="301763"/>
-      </dsp:txXfrm>
-    </dsp:sp>
-    <dsp:sp modelId="{4E423C09-9D7A-4C68-BDDF-102C9A10763A}">
-      <dsp:nvSpPr>
-        <dsp:cNvPr id="0" name=""/>
-        <dsp:cNvSpPr/>
-      </dsp:nvSpPr>
-      <dsp:spPr>
-        <a:xfrm>
-          <a:off x="932595" y="1583132"/>
-          <a:ext cx="1490185" cy="1490185"/>
-        </a:xfrm>
-        <a:prstGeom prst="ellipse">
-          <a:avLst/>
-        </a:prstGeom>
-        <a:solidFill>
-          <a:schemeClr val="accent4">
-            <a:hueOff val="10395692"/>
-            <a:satOff val="-47968"/>
-            <a:lumOff val="1765"/>
-            <a:alphaOff val="0"/>
-          </a:schemeClr>
-        </a:solidFill>
-        <a:ln w="19050" cap="flat" cmpd="sng" algn="ctr">
-          <a:solidFill>
-            <a:schemeClr val="lt1">
-              <a:hueOff val="0"/>
-              <a:satOff val="0"/>
-              <a:lumOff val="0"/>
-              <a:alphaOff val="0"/>
-            </a:schemeClr>
-          </a:solidFill>
-          <a:prstDash val="solid"/>
-          <a:miter lim="800000"/>
-        </a:ln>
-        <a:effectLst/>
-      </dsp:spPr>
-      <dsp:style>
-        <a:lnRef idx="3">
-          <a:scrgbClr r="0" g="0" b="0"/>
-        </a:lnRef>
-        <a:fillRef idx="1">
-          <a:scrgbClr r="0" g="0" b="0"/>
-        </a:fillRef>
-        <a:effectRef idx="1">
-          <a:scrgbClr r="0" g="0" b="0"/>
-        </a:effectRef>
-        <a:fontRef idx="minor">
-          <a:schemeClr val="lt1"/>
-        </a:fontRef>
-      </dsp:style>
-      <dsp:txBody>
-        <a:bodyPr spcFirstLastPara="0" vert="horz" wrap="square" lIns="20320" tIns="20320" rIns="20320" bIns="20320" numCol="1" spcCol="1270" anchor="ctr" anchorCtr="0">
-          <a:noAutofit/>
-        </a:bodyPr>
-        <a:lstStyle/>
-        <a:p>
-          <a:pPr lvl="0" algn="ctr" defTabSz="711200">
-            <a:lnSpc>
-              <a:spcPct val="90000"/>
-            </a:lnSpc>
-            <a:spcBef>
-              <a:spcPct val="0"/>
-            </a:spcBef>
-            <a:spcAft>
-              <a:spcPct val="35000"/>
-            </a:spcAft>
-          </a:pPr>
-          <a:r>
-            <a:rPr lang="pt-BR" sz="1600" kern="1200" dirty="0" smtClean="0"/>
-            <a:t>Rodar o teste</a:t>
-          </a:r>
-          <a:endParaRPr lang="pt-BR" sz="1600" kern="1200" dirty="0"/>
-        </a:p>
-      </dsp:txBody>
-      <dsp:txXfrm>
-        <a:off x="1150828" y="1801365"/>
-        <a:ext cx="1053719" cy="1053719"/>
-      </dsp:txXfrm>
-    </dsp:sp>
-    <dsp:sp modelId="{3D437D27-BD42-409B-B4F2-68999AFBAC89}">
-      <dsp:nvSpPr>
-        <dsp:cNvPr id="0" name=""/>
-        <dsp:cNvSpPr/>
-      </dsp:nvSpPr>
-      <dsp:spPr>
-        <a:xfrm rot="18900000">
-          <a:off x="2262880" y="1293249"/>
-          <a:ext cx="396628" cy="502937"/>
-        </a:xfrm>
-        <a:prstGeom prst="rightArrow">
-          <a:avLst>
-            <a:gd name="adj1" fmla="val 60000"/>
-            <a:gd name="adj2" fmla="val 50000"/>
-          </a:avLst>
-        </a:prstGeom>
-        <a:solidFill>
-          <a:schemeClr val="accent4">
-            <a:hueOff val="10395692"/>
-            <a:satOff val="-47968"/>
-            <a:lumOff val="1765"/>
-            <a:alphaOff val="0"/>
-          </a:schemeClr>
-        </a:solidFill>
-        <a:ln>
-          <a:noFill/>
-        </a:ln>
-        <a:effectLst/>
-      </dsp:spPr>
-      <dsp:style>
-        <a:lnRef idx="0">
-          <a:scrgbClr r="0" g="0" b="0"/>
-        </a:lnRef>
-        <a:fillRef idx="1">
-          <a:scrgbClr r="0" g="0" b="0"/>
-        </a:fillRef>
-        <a:effectRef idx="1">
-          <a:scrgbClr r="0" g="0" b="0"/>
-        </a:effectRef>
-        <a:fontRef idx="minor">
-          <a:schemeClr val="lt1"/>
-        </a:fontRef>
-      </dsp:style>
-      <dsp:txBody>
-        <a:bodyPr spcFirstLastPara="0" vert="horz" wrap="square" lIns="0" tIns="0" rIns="0" bIns="0" numCol="1" spcCol="1270" anchor="ctr" anchorCtr="0">
-          <a:noAutofit/>
-        </a:bodyPr>
-        <a:lstStyle/>
-        <a:p>
-          <a:pPr lvl="0" algn="ctr" defTabSz="577850">
-            <a:lnSpc>
-              <a:spcPct val="90000"/>
-            </a:lnSpc>
-            <a:spcBef>
-              <a:spcPct val="0"/>
-            </a:spcBef>
-            <a:spcAft>
-              <a:spcPct val="35000"/>
-            </a:spcAft>
-          </a:pPr>
-          <a:endParaRPr lang="pt-BR" sz="1300" kern="1200"/>
-        </a:p>
-      </dsp:txBody>
-      <dsp:txXfrm>
-        <a:off x="2280305" y="1435905"/>
-        <a:ext cx="277640" cy="301763"/>
-      </dsp:txXfrm>
-    </dsp:sp>
   </dsp:spTree>
 </dsp:drawing>
 </file>
@@ -3436,7 +2848,7 @@
           <a:p>
             <a:fld id="{ED95D740-6A7E-4AE4-809A-1783B6BB9E99}" type="datetimeFigureOut">
               <a:rPr lang="pt-BR" smtClean="0"/>
-              <a:t>20/08/2014</a:t>
+              <a:t>01/10/2014</a:t>
             </a:fld>
             <a:endParaRPr lang="pt-BR" dirty="0"/>
           </a:p>
@@ -3628,7 +3040,7 @@
               <a:pPr>
                 <a:defRPr/>
               </a:pPr>
-              <a:t>20/08/2014</a:t>
+              <a:t>01/10/2014</a:t>
             </a:fld>
             <a:endParaRPr lang="pt-BR" dirty="0"/>
           </a:p>
@@ -11062,7 +10474,7 @@
               <a:pPr>
                 <a:defRPr/>
               </a:pPr>
-              <a:t>20/08/2014</a:t>
+              <a:t>01/10/2014</a:t>
             </a:fld>
             <a:endParaRPr lang="pt-BR" dirty="0"/>
           </a:p>
@@ -11417,7 +10829,7 @@
               <a:pPr>
                 <a:defRPr/>
               </a:pPr>
-              <a:t>20/08/2014</a:t>
+              <a:t>01/10/2014</a:t>
             </a:fld>
             <a:endParaRPr lang="pt-BR" dirty="0"/>
           </a:p>
@@ -11742,7 +11154,7 @@
               <a:pPr>
                 <a:defRPr/>
               </a:pPr>
-              <a:t>20/08/2014</a:t>
+              <a:t>01/10/2014</a:t>
             </a:fld>
             <a:endParaRPr lang="pt-BR" dirty="0"/>
           </a:p>
@@ -12146,7 +11558,7 @@
               <a:pPr>
                 <a:defRPr/>
               </a:pPr>
-              <a:t>20/08/2014</a:t>
+              <a:t>01/10/2014</a:t>
             </a:fld>
             <a:endParaRPr lang="pt-BR" dirty="0"/>
           </a:p>
@@ -12489,7 +11901,7 @@
               <a:pPr>
                 <a:defRPr/>
               </a:pPr>
-              <a:t>20/08/2014</a:t>
+              <a:t>01/10/2014</a:t>
             </a:fld>
             <a:endParaRPr lang="pt-BR" dirty="0"/>
           </a:p>
@@ -13021,7 +12433,7 @@
               <a:pPr>
                 <a:defRPr/>
               </a:pPr>
-              <a:t>20/08/2014</a:t>
+              <a:t>01/10/2014</a:t>
             </a:fld>
             <a:endParaRPr lang="pt-BR" dirty="0"/>
           </a:p>
@@ -13629,7 +13041,7 @@
               <a:pPr>
                 <a:defRPr/>
               </a:pPr>
-              <a:t>20/08/2014</a:t>
+              <a:t>01/10/2014</a:t>
             </a:fld>
             <a:endParaRPr lang="pt-BR" dirty="0"/>
           </a:p>
@@ -13897,7 +13309,7 @@
               <a:pPr>
                 <a:defRPr/>
               </a:pPr>
-              <a:t>20/08/2014</a:t>
+              <a:t>01/10/2014</a:t>
             </a:fld>
             <a:endParaRPr lang="pt-BR" dirty="0"/>
           </a:p>
@@ -14019,7 +13431,7 @@
               <a:pPr>
                 <a:defRPr/>
               </a:pPr>
-              <a:t>20/08/2014</a:t>
+              <a:t>01/10/2014</a:t>
             </a:fld>
             <a:endParaRPr lang="pt-BR" dirty="0"/>
           </a:p>
@@ -14343,7 +13755,7 @@
               <a:pPr>
                 <a:defRPr/>
               </a:pPr>
-              <a:t>20/08/2014</a:t>
+              <a:t>01/10/2014</a:t>
             </a:fld>
             <a:endParaRPr lang="pt-BR" dirty="0"/>
           </a:p>
@@ -14630,7 +14042,7 @@
               <a:pPr>
                 <a:defRPr/>
               </a:pPr>
-              <a:t>20/08/2014</a:t>
+              <a:t>01/10/2014</a:t>
             </a:fld>
             <a:endParaRPr lang="pt-BR" dirty="0"/>
           </a:p>
@@ -14923,7 +14335,7 @@
               <a:pPr>
                 <a:defRPr/>
               </a:pPr>
-              <a:t>20/08/2014</a:t>
+              <a:t>01/10/2014</a:t>
             </a:fld>
             <a:endParaRPr lang="pt-BR" dirty="0"/>
           </a:p>
@@ -22880,7 +22292,7 @@
         </p:blipFill>
         <p:spPr bwMode="auto">
           <a:xfrm>
-            <a:off x="3816942" y="1979614"/>
+            <a:off x="4201752" y="2215356"/>
             <a:ext cx="4324350" cy="3571875"/>
           </a:xfrm>
           <a:prstGeom prst="rect">
@@ -26627,8 +26039,12 @@
           <a:lstStyle/>
           <a:p>
             <a:r>
+              <a:rPr lang="pt-BR" dirty="0" err="1" smtClean="0"/>
+              <a:t>Monitoramente</a:t>
+            </a:r>
+            <a:r>
               <a:rPr lang="pt-BR" dirty="0" smtClean="0"/>
-              <a:t>Aviso de Chegada de Arquivos</a:t>
+              <a:t> de Blog</a:t>
             </a:r>
             <a:endParaRPr lang="pt-BR" dirty="0"/>
           </a:p>
@@ -41791,6 +41207,46 @@
               </a:rPr>
               <a:t>*</a:t>
             </a:r>
+          </a:p>
+          <a:p>
+            <a:r>
+              <a:rPr lang="pt-BR" sz="2800" dirty="0" err="1" smtClean="0">
+                <a:sym typeface="Arial" panose="020B0604020202020204" pitchFamily="34" charset="0"/>
+              </a:rPr>
+              <a:t>Extract</a:t>
+            </a:r>
+            <a:r>
+              <a:rPr lang="pt-BR" sz="2800" dirty="0" smtClean="0">
+                <a:sym typeface="Arial" panose="020B0604020202020204" pitchFamily="34" charset="0"/>
+              </a:rPr>
+              <a:t> </a:t>
+            </a:r>
+            <a:r>
+              <a:rPr lang="pt-BR" sz="2800" dirty="0" err="1" smtClean="0">
+                <a:sym typeface="Arial" panose="020B0604020202020204" pitchFamily="34" charset="0"/>
+              </a:rPr>
+              <a:t>Method</a:t>
+            </a:r>
+            <a:r>
+              <a:rPr lang="pt-BR" sz="2800" dirty="0" smtClean="0">
+                <a:sym typeface="Arial" panose="020B0604020202020204" pitchFamily="34" charset="0"/>
+              </a:rPr>
+              <a:t>*</a:t>
+            </a:r>
+          </a:p>
+          <a:p>
+            <a:r>
+              <a:rPr lang="pt-BR" sz="2800" dirty="0" smtClean="0">
+                <a:sym typeface="Arial" panose="020B0604020202020204" pitchFamily="34" charset="0"/>
+              </a:rPr>
+              <a:t>Move </a:t>
+            </a:r>
+            <a:r>
+              <a:rPr lang="pt-BR" sz="2800" dirty="0" err="1" smtClean="0">
+                <a:sym typeface="Arial" panose="020B0604020202020204" pitchFamily="34" charset="0"/>
+              </a:rPr>
+              <a:t>Method</a:t>
+            </a:r>
             <a:endParaRPr lang="pt-BR" sz="2800" dirty="0" smtClean="0">
               <a:sym typeface="Arial" panose="020B0604020202020204" pitchFamily="34" charset="0"/>
             </a:endParaRPr>
@@ -41800,7 +41256,7 @@
               <a:rPr lang="pt-BR" sz="2800" dirty="0" err="1" smtClean="0">
                 <a:sym typeface="Arial" panose="020B0604020202020204" pitchFamily="34" charset="0"/>
               </a:rPr>
-              <a:t>Extract</a:t>
+              <a:t>Rename</a:t>
             </a:r>
             <a:r>
               <a:rPr lang="pt-BR" sz="2800" dirty="0" smtClean="0">
@@ -41820,55 +41276,6 @@
               </a:rPr>
               <a:t>*</a:t>
             </a:r>
-            <a:endParaRPr lang="pt-BR" sz="2800" dirty="0" smtClean="0">
-              <a:sym typeface="Arial" panose="020B0604020202020204" pitchFamily="34" charset="0"/>
-            </a:endParaRPr>
-          </a:p>
-          <a:p>
-            <a:r>
-              <a:rPr lang="pt-BR" sz="2800" dirty="0" smtClean="0">
-                <a:sym typeface="Arial" panose="020B0604020202020204" pitchFamily="34" charset="0"/>
-              </a:rPr>
-              <a:t>Move </a:t>
-            </a:r>
-            <a:r>
-              <a:rPr lang="pt-BR" sz="2800" dirty="0" err="1" smtClean="0">
-                <a:sym typeface="Arial" panose="020B0604020202020204" pitchFamily="34" charset="0"/>
-              </a:rPr>
-              <a:t>Method</a:t>
-            </a:r>
-            <a:endParaRPr lang="pt-BR" sz="2800" dirty="0" smtClean="0">
-              <a:sym typeface="Arial" panose="020B0604020202020204" pitchFamily="34" charset="0"/>
-            </a:endParaRPr>
-          </a:p>
-          <a:p>
-            <a:r>
-              <a:rPr lang="pt-BR" sz="2800" dirty="0" err="1" smtClean="0">
-                <a:sym typeface="Arial" panose="020B0604020202020204" pitchFamily="34" charset="0"/>
-              </a:rPr>
-              <a:t>Rename</a:t>
-            </a:r>
-            <a:r>
-              <a:rPr lang="pt-BR" sz="2800" dirty="0" smtClean="0">
-                <a:sym typeface="Arial" panose="020B0604020202020204" pitchFamily="34" charset="0"/>
-              </a:rPr>
-              <a:t> </a:t>
-            </a:r>
-            <a:r>
-              <a:rPr lang="pt-BR" sz="2800" dirty="0" err="1" smtClean="0">
-                <a:sym typeface="Arial" panose="020B0604020202020204" pitchFamily="34" charset="0"/>
-              </a:rPr>
-              <a:t>Method</a:t>
-            </a:r>
-            <a:r>
-              <a:rPr lang="pt-BR" sz="2800" dirty="0" smtClean="0">
-                <a:sym typeface="Arial" panose="020B0604020202020204" pitchFamily="34" charset="0"/>
-              </a:rPr>
-              <a:t>*</a:t>
-            </a:r>
-            <a:endParaRPr lang="pt-BR" sz="2800" dirty="0" smtClean="0">
-              <a:sym typeface="Arial" panose="020B0604020202020204" pitchFamily="34" charset="0"/>
-            </a:endParaRPr>
           </a:p>
           <a:p>
             <a:pPr algn="just">
@@ -42209,46 +41616,34 @@
               <a:rPr lang="pt-BR" sz="2800" dirty="0" smtClean="0">
                 <a:sym typeface="Arial" panose="020B0604020202020204" pitchFamily="34" charset="0"/>
               </a:rPr>
+              <a:t> Field*</a:t>
+            </a:r>
+          </a:p>
+          <a:p>
+            <a:r>
+              <a:rPr lang="pt-BR" sz="2800" dirty="0" err="1" smtClean="0">
+                <a:sym typeface="Arial" panose="020B0604020202020204" pitchFamily="34" charset="0"/>
+              </a:rPr>
+              <a:t>Hide</a:t>
+            </a:r>
+            <a:r>
+              <a:rPr lang="pt-BR" sz="2800" dirty="0" smtClean="0">
+                <a:sym typeface="Arial" panose="020B0604020202020204" pitchFamily="34" charset="0"/>
+              </a:rPr>
               <a:t> </a:t>
             </a:r>
             <a:r>
+              <a:rPr lang="pt-BR" sz="2800" dirty="0" err="1" smtClean="0">
+                <a:sym typeface="Arial" panose="020B0604020202020204" pitchFamily="34" charset="0"/>
+              </a:rPr>
+              <a:t>Method</a:t>
+            </a:r>
+            <a:r>
               <a:rPr lang="pt-BR" sz="2800" dirty="0" smtClean="0">
                 <a:sym typeface="Arial" panose="020B0604020202020204" pitchFamily="34" charset="0"/>
               </a:rPr>
-              <a:t>Field*</a:t>
-            </a:r>
-            <a:endParaRPr lang="pt-BR" sz="2800" dirty="0" smtClean="0">
-              <a:sym typeface="Arial" panose="020B0604020202020204" pitchFamily="34" charset="0"/>
-            </a:endParaRPr>
-          </a:p>
-          <a:p>
-            <a:r>
-              <a:rPr lang="pt-BR" sz="2800" dirty="0" err="1" smtClean="0">
-                <a:sym typeface="Arial" panose="020B0604020202020204" pitchFamily="34" charset="0"/>
-              </a:rPr>
-              <a:t>Hide</a:t>
-            </a:r>
-            <a:r>
-              <a:rPr lang="pt-BR" sz="2800" dirty="0" smtClean="0">
-                <a:sym typeface="Arial" panose="020B0604020202020204" pitchFamily="34" charset="0"/>
-              </a:rPr>
-              <a:t> </a:t>
-            </a:r>
-            <a:r>
-              <a:rPr lang="pt-BR" sz="2800" dirty="0" err="1" smtClean="0">
-                <a:sym typeface="Arial" panose="020B0604020202020204" pitchFamily="34" charset="0"/>
-              </a:rPr>
-              <a:t>Method</a:t>
-            </a:r>
-            <a:r>
-              <a:rPr lang="pt-BR" sz="2800" dirty="0" smtClean="0">
-                <a:sym typeface="Arial" panose="020B0604020202020204" pitchFamily="34" charset="0"/>
-              </a:rPr>
               <a:t>*</a:t>
             </a:r>
-            <a:endParaRPr lang="pt-BR" sz="2800" dirty="0" smtClean="0">
-              <a:sym typeface="Arial" panose="020B0604020202020204" pitchFamily="34" charset="0"/>
-            </a:endParaRPr>
           </a:p>
           <a:p>
             <a:r>

</xml_diff>